<commit_message>
Relational design lection added.
</commit_message>
<xml_diff>
--- a/sql/lectures/8_relational_design.pptx
+++ b/sql/lectures/8_relational_design.pptx
@@ -4,6 +4,9 @@
   <p:sldMasterIdLst>
     <p:sldMasterId id="2147483668" r:id="rId1"/>
   </p:sldMasterIdLst>
+  <p:notesMasterIdLst>
+    <p:notesMasterId r:id="rId28"/>
+  </p:notesMasterIdLst>
   <p:sldIdLst>
     <p:sldId id="256" r:id="rId2"/>
     <p:sldId id="258" r:id="rId3"/>
@@ -18,6 +21,19 @@
     <p:sldId id="267" r:id="rId12"/>
     <p:sldId id="269" r:id="rId13"/>
     <p:sldId id="270" r:id="rId14"/>
+    <p:sldId id="271" r:id="rId15"/>
+    <p:sldId id="272" r:id="rId16"/>
+    <p:sldId id="273" r:id="rId17"/>
+    <p:sldId id="274" r:id="rId18"/>
+    <p:sldId id="275" r:id="rId19"/>
+    <p:sldId id="276" r:id="rId20"/>
+    <p:sldId id="277" r:id="rId21"/>
+    <p:sldId id="278" r:id="rId22"/>
+    <p:sldId id="279" r:id="rId23"/>
+    <p:sldId id="281" r:id="rId24"/>
+    <p:sldId id="280" r:id="rId25"/>
+    <p:sldId id="282" r:id="rId26"/>
+    <p:sldId id="283" r:id="rId27"/>
   </p:sldIdLst>
   <p:sldSz cx="9144000" cy="6858000" type="screen4x3"/>
   <p:notesSz cx="6858000" cy="9144000"/>
@@ -135,6 +151,440 @@
 </p:presentation>
 </file>
 
+<file path=ppt/notesMasters/notesMaster1.xml><?xml version="1.0" encoding="utf-8"?>
+<p:notesMaster xmlns:a="http://schemas.openxmlformats.org/drawingml/2006/main" xmlns:r="http://schemas.openxmlformats.org/officeDocument/2006/relationships" xmlns:p="http://schemas.openxmlformats.org/presentationml/2006/main">
+  <p:cSld>
+    <p:bg>
+      <p:bgRef idx="1001">
+        <a:schemeClr val="bg1"/>
+      </p:bgRef>
+    </p:bg>
+    <p:spTree>
+      <p:nvGrpSpPr>
+        <p:cNvPr id="1" name=""/>
+        <p:cNvGrpSpPr/>
+        <p:nvPr/>
+      </p:nvGrpSpPr>
+      <p:grpSpPr>
+        <a:xfrm>
+          <a:off x="0" y="0"/>
+          <a:ext cx="0" cy="0"/>
+          <a:chOff x="0" y="0"/>
+          <a:chExt cx="0" cy="0"/>
+        </a:xfrm>
+      </p:grpSpPr>
+      <p:sp>
+        <p:nvSpPr>
+          <p:cNvPr id="2" name="Header Placeholder 1"/>
+          <p:cNvSpPr>
+            <a:spLocks noGrp="1"/>
+          </p:cNvSpPr>
+          <p:nvPr>
+            <p:ph type="hdr" sz="quarter"/>
+          </p:nvPr>
+        </p:nvSpPr>
+        <p:spPr>
+          <a:xfrm>
+            <a:off x="0" y="0"/>
+            <a:ext cx="2971800" cy="458788"/>
+          </a:xfrm>
+          <a:prstGeom prst="rect">
+            <a:avLst/>
+          </a:prstGeom>
+        </p:spPr>
+        <p:txBody>
+          <a:bodyPr vert="horz" lIns="91440" tIns="45720" rIns="91440" bIns="45720" rtlCol="0"/>
+          <a:lstStyle>
+            <a:lvl1pPr algn="l">
+              <a:defRPr sz="1200"/>
+            </a:lvl1pPr>
+          </a:lstStyle>
+          <a:p>
+            <a:endParaRPr lang="en-US"/>
+          </a:p>
+        </p:txBody>
+      </p:sp>
+      <p:sp>
+        <p:nvSpPr>
+          <p:cNvPr id="3" name="Date Placeholder 2"/>
+          <p:cNvSpPr>
+            <a:spLocks noGrp="1"/>
+          </p:cNvSpPr>
+          <p:nvPr>
+            <p:ph type="dt" idx="1"/>
+          </p:nvPr>
+        </p:nvSpPr>
+        <p:spPr>
+          <a:xfrm>
+            <a:off x="3884613" y="0"/>
+            <a:ext cx="2971800" cy="458788"/>
+          </a:xfrm>
+          <a:prstGeom prst="rect">
+            <a:avLst/>
+          </a:prstGeom>
+        </p:spPr>
+        <p:txBody>
+          <a:bodyPr vert="horz" lIns="91440" tIns="45720" rIns="91440" bIns="45720" rtlCol="0"/>
+          <a:lstStyle>
+            <a:lvl1pPr algn="r">
+              <a:defRPr sz="1200"/>
+            </a:lvl1pPr>
+          </a:lstStyle>
+          <a:p>
+            <a:fld id="{1C0777A7-133F-4858-8AB3-833D62427676}" type="datetimeFigureOut">
+              <a:rPr lang="en-US" smtClean="0"/>
+              <a:t>10/12/2013</a:t>
+            </a:fld>
+            <a:endParaRPr lang="en-US"/>
+          </a:p>
+        </p:txBody>
+      </p:sp>
+      <p:sp>
+        <p:nvSpPr>
+          <p:cNvPr id="4" name="Slide Image Placeholder 3"/>
+          <p:cNvSpPr>
+            <a:spLocks noGrp="1" noRot="1" noChangeAspect="1"/>
+          </p:cNvSpPr>
+          <p:nvPr>
+            <p:ph type="sldImg" idx="2"/>
+          </p:nvPr>
+        </p:nvSpPr>
+        <p:spPr>
+          <a:xfrm>
+            <a:off x="1371600" y="1143000"/>
+            <a:ext cx="4114800" cy="3086100"/>
+          </a:xfrm>
+          <a:prstGeom prst="rect">
+            <a:avLst/>
+          </a:prstGeom>
+          <a:noFill/>
+          <a:ln w="12700">
+            <a:solidFill>
+              <a:prstClr val="black"/>
+            </a:solidFill>
+          </a:ln>
+        </p:spPr>
+        <p:txBody>
+          <a:bodyPr vert="horz" lIns="91440" tIns="45720" rIns="91440" bIns="45720" rtlCol="0" anchor="ctr"/>
+          <a:lstStyle/>
+          <a:p>
+            <a:endParaRPr lang="en-US"/>
+          </a:p>
+        </p:txBody>
+      </p:sp>
+      <p:sp>
+        <p:nvSpPr>
+          <p:cNvPr id="5" name="Notes Placeholder 4"/>
+          <p:cNvSpPr>
+            <a:spLocks noGrp="1"/>
+          </p:cNvSpPr>
+          <p:nvPr>
+            <p:ph type="body" sz="quarter" idx="3"/>
+          </p:nvPr>
+        </p:nvSpPr>
+        <p:spPr>
+          <a:xfrm>
+            <a:off x="685800" y="4400550"/>
+            <a:ext cx="5486400" cy="3600450"/>
+          </a:xfrm>
+          <a:prstGeom prst="rect">
+            <a:avLst/>
+          </a:prstGeom>
+        </p:spPr>
+        <p:txBody>
+          <a:bodyPr vert="horz" lIns="91440" tIns="45720" rIns="91440" bIns="45720" rtlCol="0"/>
+          <a:lstStyle/>
+          <a:p>
+            <a:pPr lvl="0"/>
+            <a:r>
+              <a:rPr lang="en-US" smtClean="0"/>
+              <a:t>Click to edit Master text styles</a:t>
+            </a:r>
+          </a:p>
+          <a:p>
+            <a:pPr lvl="1"/>
+            <a:r>
+              <a:rPr lang="en-US" smtClean="0"/>
+              <a:t>Second level</a:t>
+            </a:r>
+          </a:p>
+          <a:p>
+            <a:pPr lvl="2"/>
+            <a:r>
+              <a:rPr lang="en-US" smtClean="0"/>
+              <a:t>Third level</a:t>
+            </a:r>
+          </a:p>
+          <a:p>
+            <a:pPr lvl="3"/>
+            <a:r>
+              <a:rPr lang="en-US" smtClean="0"/>
+              <a:t>Fourth level</a:t>
+            </a:r>
+          </a:p>
+          <a:p>
+            <a:pPr lvl="4"/>
+            <a:r>
+              <a:rPr lang="en-US" smtClean="0"/>
+              <a:t>Fifth level</a:t>
+            </a:r>
+            <a:endParaRPr lang="en-US"/>
+          </a:p>
+        </p:txBody>
+      </p:sp>
+      <p:sp>
+        <p:nvSpPr>
+          <p:cNvPr id="6" name="Footer Placeholder 5"/>
+          <p:cNvSpPr>
+            <a:spLocks noGrp="1"/>
+          </p:cNvSpPr>
+          <p:nvPr>
+            <p:ph type="ftr" sz="quarter" idx="4"/>
+          </p:nvPr>
+        </p:nvSpPr>
+        <p:spPr>
+          <a:xfrm>
+            <a:off x="0" y="8685213"/>
+            <a:ext cx="2971800" cy="458787"/>
+          </a:xfrm>
+          <a:prstGeom prst="rect">
+            <a:avLst/>
+          </a:prstGeom>
+        </p:spPr>
+        <p:txBody>
+          <a:bodyPr vert="horz" lIns="91440" tIns="45720" rIns="91440" bIns="45720" rtlCol="0" anchor="b"/>
+          <a:lstStyle>
+            <a:lvl1pPr algn="l">
+              <a:defRPr sz="1200"/>
+            </a:lvl1pPr>
+          </a:lstStyle>
+          <a:p>
+            <a:endParaRPr lang="en-US"/>
+          </a:p>
+        </p:txBody>
+      </p:sp>
+      <p:sp>
+        <p:nvSpPr>
+          <p:cNvPr id="7" name="Slide Number Placeholder 6"/>
+          <p:cNvSpPr>
+            <a:spLocks noGrp="1"/>
+          </p:cNvSpPr>
+          <p:nvPr>
+            <p:ph type="sldNum" sz="quarter" idx="5"/>
+          </p:nvPr>
+        </p:nvSpPr>
+        <p:spPr>
+          <a:xfrm>
+            <a:off x="3884613" y="8685213"/>
+            <a:ext cx="2971800" cy="458787"/>
+          </a:xfrm>
+          <a:prstGeom prst="rect">
+            <a:avLst/>
+          </a:prstGeom>
+        </p:spPr>
+        <p:txBody>
+          <a:bodyPr vert="horz" lIns="91440" tIns="45720" rIns="91440" bIns="45720" rtlCol="0" anchor="b"/>
+          <a:lstStyle>
+            <a:lvl1pPr algn="r">
+              <a:defRPr sz="1200"/>
+            </a:lvl1pPr>
+          </a:lstStyle>
+          <a:p>
+            <a:fld id="{86CD4A14-F60B-4867-99F3-ACE321E94792}" type="slidenum">
+              <a:rPr lang="en-US" smtClean="0"/>
+              <a:t>‹#›</a:t>
+            </a:fld>
+            <a:endParaRPr lang="en-US"/>
+          </a:p>
+        </p:txBody>
+      </p:sp>
+    </p:spTree>
+    <p:extLst>
+      <p:ext uri="{BB962C8B-B14F-4D97-AF65-F5344CB8AC3E}">
+        <p14:creationId xmlns:p14="http://schemas.microsoft.com/office/powerpoint/2010/main" val="2408685227"/>
+      </p:ext>
+    </p:extLst>
+  </p:cSld>
+  <p:clrMap bg1="lt1" tx1="dk1" bg2="lt2" tx2="dk2" accent1="accent1" accent2="accent2" accent3="accent3" accent4="accent4" accent5="accent5" accent6="accent6" hlink="hlink" folHlink="folHlink"/>
+  <p:notesStyle>
+    <a:lvl1pPr marL="0" algn="l" defTabSz="914400" rtl="0" eaLnBrk="1" latinLnBrk="0" hangingPunct="1">
+      <a:defRPr sz="1200" kern="1200">
+        <a:solidFill>
+          <a:schemeClr val="tx1"/>
+        </a:solidFill>
+        <a:latin typeface="+mn-lt"/>
+        <a:ea typeface="+mn-ea"/>
+        <a:cs typeface="+mn-cs"/>
+      </a:defRPr>
+    </a:lvl1pPr>
+    <a:lvl2pPr marL="457200" algn="l" defTabSz="914400" rtl="0" eaLnBrk="1" latinLnBrk="0" hangingPunct="1">
+      <a:defRPr sz="1200" kern="1200">
+        <a:solidFill>
+          <a:schemeClr val="tx1"/>
+        </a:solidFill>
+        <a:latin typeface="+mn-lt"/>
+        <a:ea typeface="+mn-ea"/>
+        <a:cs typeface="+mn-cs"/>
+      </a:defRPr>
+    </a:lvl2pPr>
+    <a:lvl3pPr marL="914400" algn="l" defTabSz="914400" rtl="0" eaLnBrk="1" latinLnBrk="0" hangingPunct="1">
+      <a:defRPr sz="1200" kern="1200">
+        <a:solidFill>
+          <a:schemeClr val="tx1"/>
+        </a:solidFill>
+        <a:latin typeface="+mn-lt"/>
+        <a:ea typeface="+mn-ea"/>
+        <a:cs typeface="+mn-cs"/>
+      </a:defRPr>
+    </a:lvl3pPr>
+    <a:lvl4pPr marL="1371600" algn="l" defTabSz="914400" rtl="0" eaLnBrk="1" latinLnBrk="0" hangingPunct="1">
+      <a:defRPr sz="1200" kern="1200">
+        <a:solidFill>
+          <a:schemeClr val="tx1"/>
+        </a:solidFill>
+        <a:latin typeface="+mn-lt"/>
+        <a:ea typeface="+mn-ea"/>
+        <a:cs typeface="+mn-cs"/>
+      </a:defRPr>
+    </a:lvl4pPr>
+    <a:lvl5pPr marL="1828800" algn="l" defTabSz="914400" rtl="0" eaLnBrk="1" latinLnBrk="0" hangingPunct="1">
+      <a:defRPr sz="1200" kern="1200">
+        <a:solidFill>
+          <a:schemeClr val="tx1"/>
+        </a:solidFill>
+        <a:latin typeface="+mn-lt"/>
+        <a:ea typeface="+mn-ea"/>
+        <a:cs typeface="+mn-cs"/>
+      </a:defRPr>
+    </a:lvl5pPr>
+    <a:lvl6pPr marL="2286000" algn="l" defTabSz="914400" rtl="0" eaLnBrk="1" latinLnBrk="0" hangingPunct="1">
+      <a:defRPr sz="1200" kern="1200">
+        <a:solidFill>
+          <a:schemeClr val="tx1"/>
+        </a:solidFill>
+        <a:latin typeface="+mn-lt"/>
+        <a:ea typeface="+mn-ea"/>
+        <a:cs typeface="+mn-cs"/>
+      </a:defRPr>
+    </a:lvl6pPr>
+    <a:lvl7pPr marL="2743200" algn="l" defTabSz="914400" rtl="0" eaLnBrk="1" latinLnBrk="0" hangingPunct="1">
+      <a:defRPr sz="1200" kern="1200">
+        <a:solidFill>
+          <a:schemeClr val="tx1"/>
+        </a:solidFill>
+        <a:latin typeface="+mn-lt"/>
+        <a:ea typeface="+mn-ea"/>
+        <a:cs typeface="+mn-cs"/>
+      </a:defRPr>
+    </a:lvl7pPr>
+    <a:lvl8pPr marL="3200400" algn="l" defTabSz="914400" rtl="0" eaLnBrk="1" latinLnBrk="0" hangingPunct="1">
+      <a:defRPr sz="1200" kern="1200">
+        <a:solidFill>
+          <a:schemeClr val="tx1"/>
+        </a:solidFill>
+        <a:latin typeface="+mn-lt"/>
+        <a:ea typeface="+mn-ea"/>
+        <a:cs typeface="+mn-cs"/>
+      </a:defRPr>
+    </a:lvl8pPr>
+    <a:lvl9pPr marL="3657600" algn="l" defTabSz="914400" rtl="0" eaLnBrk="1" latinLnBrk="0" hangingPunct="1">
+      <a:defRPr sz="1200" kern="1200">
+        <a:solidFill>
+          <a:schemeClr val="tx1"/>
+        </a:solidFill>
+        <a:latin typeface="+mn-lt"/>
+        <a:ea typeface="+mn-ea"/>
+        <a:cs typeface="+mn-cs"/>
+      </a:defRPr>
+    </a:lvl9pPr>
+  </p:notesStyle>
+</p:notesMaster>
+</file>
+
+<file path=ppt/notesSlides/notesSlide1.xml><?xml version="1.0" encoding="utf-8"?>
+<p:notes xmlns:a="http://schemas.openxmlformats.org/drawingml/2006/main" xmlns:r="http://schemas.openxmlformats.org/officeDocument/2006/relationships" xmlns:p="http://schemas.openxmlformats.org/presentationml/2006/main">
+  <p:cSld>
+    <p:spTree>
+      <p:nvGrpSpPr>
+        <p:cNvPr id="1" name=""/>
+        <p:cNvGrpSpPr/>
+        <p:nvPr/>
+      </p:nvGrpSpPr>
+      <p:grpSpPr>
+        <a:xfrm>
+          <a:off x="0" y="0"/>
+          <a:ext cx="0" cy="0"/>
+          <a:chOff x="0" y="0"/>
+          <a:chExt cx="0" cy="0"/>
+        </a:xfrm>
+      </p:grpSpPr>
+      <p:sp>
+        <p:nvSpPr>
+          <p:cNvPr id="2" name="Slide Image Placeholder 1"/>
+          <p:cNvSpPr>
+            <a:spLocks noGrp="1" noRot="1" noChangeAspect="1"/>
+          </p:cNvSpPr>
+          <p:nvPr>
+            <p:ph type="sldImg"/>
+          </p:nvPr>
+        </p:nvSpPr>
+        <p:spPr/>
+      </p:sp>
+      <p:sp>
+        <p:nvSpPr>
+          <p:cNvPr id="3" name="Notes Placeholder 2"/>
+          <p:cNvSpPr>
+            <a:spLocks noGrp="1"/>
+          </p:cNvSpPr>
+          <p:nvPr>
+            <p:ph type="body" idx="1"/>
+          </p:nvPr>
+        </p:nvSpPr>
+        <p:spPr/>
+        <p:txBody>
+          <a:bodyPr/>
+          <a:lstStyle/>
+          <a:p>
+            <a:endParaRPr lang="en-US"/>
+          </a:p>
+        </p:txBody>
+      </p:sp>
+      <p:sp>
+        <p:nvSpPr>
+          <p:cNvPr id="4" name="Slide Number Placeholder 3"/>
+          <p:cNvSpPr>
+            <a:spLocks noGrp="1"/>
+          </p:cNvSpPr>
+          <p:nvPr>
+            <p:ph type="sldNum" sz="quarter" idx="10"/>
+          </p:nvPr>
+        </p:nvSpPr>
+        <p:spPr/>
+        <p:txBody>
+          <a:bodyPr/>
+          <a:lstStyle/>
+          <a:p>
+            <a:fld id="{86CD4A14-F60B-4867-99F3-ACE321E94792}" type="slidenum">
+              <a:rPr lang="en-US" smtClean="0"/>
+              <a:t>21</a:t>
+            </a:fld>
+            <a:endParaRPr lang="en-US"/>
+          </a:p>
+        </p:txBody>
+      </p:sp>
+    </p:spTree>
+    <p:extLst>
+      <p:ext uri="{BB962C8B-B14F-4D97-AF65-F5344CB8AC3E}">
+        <p14:creationId xmlns:p14="http://schemas.microsoft.com/office/powerpoint/2010/main" val="3928362458"/>
+      </p:ext>
+    </p:extLst>
+  </p:cSld>
+  <p:clrMapOvr>
+    <a:masterClrMapping/>
+  </p:clrMapOvr>
+</p:notes>
+</file>
+
 <file path=ppt/slideLayouts/slideLayout1.xml><?xml version="1.0" encoding="utf-8"?>
 <p:sldLayout xmlns:a="http://schemas.openxmlformats.org/drawingml/2006/main" xmlns:r="http://schemas.openxmlformats.org/officeDocument/2006/relationships" xmlns:p="http://schemas.openxmlformats.org/presentationml/2006/main" type="title" preserve="1">
   <p:cSld name="Title Slide">
@@ -349,7 +799,7 @@
             <a:fld id="{B61BEF0D-F0BB-DE4B-95CE-6DB70DBA9567}" type="datetimeFigureOut">
               <a:rPr lang="en-US" smtClean="0"/>
               <a:pPr/>
-              <a:t>10/5/2013</a:t>
+              <a:t>10/12/2013</a:t>
             </a:fld>
             <a:endParaRPr lang="en-US" dirty="0"/>
           </a:p>
@@ -642,7 +1092,7 @@
             <a:fld id="{B61BEF0D-F0BB-DE4B-95CE-6DB70DBA9567}" type="datetimeFigureOut">
               <a:rPr lang="en-US" smtClean="0"/>
               <a:pPr/>
-              <a:t>10/5/2013</a:t>
+              <a:t>10/12/2013</a:t>
             </a:fld>
             <a:endParaRPr lang="en-US" dirty="0"/>
           </a:p>
@@ -908,7 +1358,7 @@
             <a:fld id="{B61BEF0D-F0BB-DE4B-95CE-6DB70DBA9567}" type="datetimeFigureOut">
               <a:rPr lang="en-US" smtClean="0"/>
               <a:pPr/>
-              <a:t>10/5/2013</a:t>
+              <a:t>10/12/2013</a:t>
             </a:fld>
             <a:endParaRPr lang="en-US" dirty="0"/>
           </a:p>
@@ -1470,7 +1920,7 @@
             <a:fld id="{B61BEF0D-F0BB-DE4B-95CE-6DB70DBA9567}" type="datetimeFigureOut">
               <a:rPr lang="en-US" smtClean="0"/>
               <a:pPr/>
-              <a:t>10/5/2013</a:t>
+              <a:t>10/12/2013</a:t>
             </a:fld>
             <a:endParaRPr lang="en-US" dirty="0"/>
           </a:p>
@@ -1731,7 +2181,7 @@
             <a:fld id="{B61BEF0D-F0BB-DE4B-95CE-6DB70DBA9567}" type="datetimeFigureOut">
               <a:rPr lang="en-US" smtClean="0"/>
               <a:pPr/>
-              <a:t>10/5/2013</a:t>
+              <a:t>10/12/2013</a:t>
             </a:fld>
             <a:endParaRPr lang="en-US" dirty="0"/>
           </a:p>
@@ -2309,7 +2759,7 @@
             <a:fld id="{B61BEF0D-F0BB-DE4B-95CE-6DB70DBA9567}" type="datetimeFigureOut">
               <a:rPr lang="en-US" smtClean="0"/>
               <a:pPr/>
-              <a:t>10/5/2013</a:t>
+              <a:t>10/12/2013</a:t>
             </a:fld>
             <a:endParaRPr lang="en-US" dirty="0"/>
           </a:p>
@@ -2643,7 +3093,7 @@
             <a:fld id="{B61BEF0D-F0BB-DE4B-95CE-6DB70DBA9567}" type="datetimeFigureOut">
               <a:rPr lang="en-US" smtClean="0"/>
               <a:pPr/>
-              <a:t>10/5/2013</a:t>
+              <a:t>10/12/2013</a:t>
             </a:fld>
             <a:endParaRPr lang="en-US" dirty="0"/>
           </a:p>
@@ -2820,7 +3270,7 @@
             <a:fld id="{B61BEF0D-F0BB-DE4B-95CE-6DB70DBA9567}" type="datetimeFigureOut">
               <a:rPr lang="en-US" smtClean="0"/>
               <a:pPr/>
-              <a:t>10/5/2013</a:t>
+              <a:t>10/12/2013</a:t>
             </a:fld>
             <a:endParaRPr lang="en-US" dirty="0"/>
           </a:p>
@@ -3002,7 +3452,7 @@
             <a:fld id="{B61BEF0D-F0BB-DE4B-95CE-6DB70DBA9567}" type="datetimeFigureOut">
               <a:rPr lang="en-US" smtClean="0"/>
               <a:pPr/>
-              <a:t>10/5/2013</a:t>
+              <a:t>10/12/2013</a:t>
             </a:fld>
             <a:endParaRPr lang="en-US" dirty="0"/>
           </a:p>
@@ -3174,7 +3624,7 @@
             <a:fld id="{B61BEF0D-F0BB-DE4B-95CE-6DB70DBA9567}" type="datetimeFigureOut">
               <a:rPr lang="en-US" smtClean="0"/>
               <a:pPr/>
-              <a:t>10/5/2013</a:t>
+              <a:t>10/12/2013</a:t>
             </a:fld>
             <a:endParaRPr lang="en-US" dirty="0"/>
           </a:p>
@@ -3435,7 +3885,7 @@
             <a:fld id="{B61BEF0D-F0BB-DE4B-95CE-6DB70DBA9567}" type="datetimeFigureOut">
               <a:rPr lang="en-US" smtClean="0"/>
               <a:pPr/>
-              <a:t>10/5/2013</a:t>
+              <a:t>10/12/2013</a:t>
             </a:fld>
             <a:endParaRPr lang="en-US" dirty="0"/>
           </a:p>
@@ -3729,7 +4179,7 @@
             <a:fld id="{B61BEF0D-F0BB-DE4B-95CE-6DB70DBA9567}" type="datetimeFigureOut">
               <a:rPr lang="en-US" smtClean="0"/>
               <a:pPr/>
-              <a:t>10/5/2013</a:t>
+              <a:t>10/12/2013</a:t>
             </a:fld>
             <a:endParaRPr lang="en-US" dirty="0"/>
           </a:p>
@@ -4161,7 +4611,7 @@
             <a:fld id="{B61BEF0D-F0BB-DE4B-95CE-6DB70DBA9567}" type="datetimeFigureOut">
               <a:rPr lang="en-US" smtClean="0"/>
               <a:pPr/>
-              <a:t>10/5/2013</a:t>
+              <a:t>10/12/2013</a:t>
             </a:fld>
             <a:endParaRPr lang="en-US" dirty="0"/>
           </a:p>
@@ -4287,7 +4737,7 @@
             <a:fld id="{B61BEF0D-F0BB-DE4B-95CE-6DB70DBA9567}" type="datetimeFigureOut">
               <a:rPr lang="en-US" smtClean="0"/>
               <a:pPr/>
-              <a:t>10/5/2013</a:t>
+              <a:t>10/12/2013</a:t>
             </a:fld>
             <a:endParaRPr lang="en-US" dirty="0"/>
           </a:p>
@@ -4384,7 +4834,7 @@
             <a:fld id="{B61BEF0D-F0BB-DE4B-95CE-6DB70DBA9567}" type="datetimeFigureOut">
               <a:rPr lang="en-US" smtClean="0"/>
               <a:pPr/>
-              <a:t>10/5/2013</a:t>
+              <a:t>10/12/2013</a:t>
             </a:fld>
             <a:endParaRPr lang="en-US" dirty="0"/>
           </a:p>
@@ -4669,7 +5119,7 @@
             <a:fld id="{B61BEF0D-F0BB-DE4B-95CE-6DB70DBA9567}" type="datetimeFigureOut">
               <a:rPr lang="en-US" smtClean="0"/>
               <a:pPr/>
-              <a:t>10/5/2013</a:t>
+              <a:t>10/12/2013</a:t>
             </a:fld>
             <a:endParaRPr lang="en-US" dirty="0"/>
           </a:p>
@@ -4962,7 +5412,7 @@
             <a:fld id="{B61BEF0D-F0BB-DE4B-95CE-6DB70DBA9567}" type="datetimeFigureOut">
               <a:rPr lang="en-US" smtClean="0"/>
               <a:pPr/>
-              <a:t>10/5/2013</a:t>
+              <a:t>10/12/2013</a:t>
             </a:fld>
             <a:endParaRPr lang="en-US" dirty="0"/>
           </a:p>
@@ -5195,7 +5645,7 @@
             <a:fld id="{B61BEF0D-F0BB-DE4B-95CE-6DB70DBA9567}" type="datetimeFigureOut">
               <a:rPr lang="en-US" smtClean="0"/>
               <a:pPr/>
-              <a:t>10/5/2013</a:t>
+              <a:t>10/12/2013</a:t>
             </a:fld>
             <a:endParaRPr lang="en-US" dirty="0"/>
           </a:p>
@@ -5984,10 +6434,6 @@
               <a:rPr lang="ru-RU" dirty="0" smtClean="0"/>
               <a:t>РЕЛЯЦИОННЫЙ ДИЗАЙН</a:t>
             </a:r>
-            <a:r>
-              <a:rPr lang="ru-RU" dirty="0" smtClean="0"/>
-              <a:t/>
-            </a:r>
             <a:br>
               <a:rPr lang="ru-RU" dirty="0" smtClean="0"/>
             </a:br>
@@ -7017,6 +7463,1440 @@
 </p:sld>
 </file>
 
+<file path=ppt/slides/slide14.xml><?xml version="1.0" encoding="utf-8"?>
+<p:sld xmlns:a="http://schemas.openxmlformats.org/drawingml/2006/main" xmlns:r="http://schemas.openxmlformats.org/officeDocument/2006/relationships" xmlns:p="http://schemas.openxmlformats.org/presentationml/2006/main">
+  <p:cSld>
+    <p:spTree>
+      <p:nvGrpSpPr>
+        <p:cNvPr id="1" name=""/>
+        <p:cNvGrpSpPr/>
+        <p:nvPr/>
+      </p:nvGrpSpPr>
+      <p:grpSpPr>
+        <a:xfrm>
+          <a:off x="0" y="0"/>
+          <a:ext cx="0" cy="0"/>
+          <a:chOff x="0" y="0"/>
+          <a:chExt cx="0" cy="0"/>
+        </a:xfrm>
+      </p:grpSpPr>
+      <p:sp>
+        <p:nvSpPr>
+          <p:cNvPr id="2" name="Title 1"/>
+          <p:cNvSpPr>
+            <a:spLocks noGrp="1"/>
+          </p:cNvSpPr>
+          <p:nvPr>
+            <p:ph type="title"/>
+          </p:nvPr>
+        </p:nvSpPr>
+        <p:spPr/>
+        <p:txBody>
+          <a:bodyPr/>
+          <a:lstStyle/>
+          <a:p>
+            <a:r>
+              <a:rPr lang="ru-RU" dirty="0" smtClean="0"/>
+              <a:t>Вопрос</a:t>
+            </a:r>
+            <a:endParaRPr lang="en-US" dirty="0"/>
+          </a:p>
+        </p:txBody>
+      </p:sp>
+      <p:sp>
+        <p:nvSpPr>
+          <p:cNvPr id="3" name="Content Placeholder 2"/>
+          <p:cNvSpPr>
+            <a:spLocks noGrp="1"/>
+          </p:cNvSpPr>
+          <p:nvPr>
+            <p:ph idx="1"/>
+          </p:nvPr>
+        </p:nvSpPr>
+        <p:spPr>
+          <a:xfrm>
+            <a:off x="818348" y="1908498"/>
+            <a:ext cx="7511472" cy="4949502"/>
+          </a:xfrm>
+        </p:spPr>
+        <p:txBody>
+          <a:bodyPr/>
+          <a:lstStyle/>
+          <a:p>
+            <a:pPr marL="0" indent="0">
+              <a:buNone/>
+            </a:pPr>
+            <a:r>
+              <a:rPr lang="ru-RU" dirty="0" smtClean="0"/>
+              <a:t>Рассмотрим базу данных, содержащую информацию о курсах, которые посещают студенты. У каждого студента есть уникальный идентификатор (</a:t>
+            </a:r>
+            <a:r>
+              <a:rPr lang="en-US" dirty="0" smtClean="0"/>
+              <a:t>student ID) </a:t>
+            </a:r>
+            <a:r>
+              <a:rPr lang="ru-RU" dirty="0" smtClean="0"/>
+              <a:t>и, возможно, неуникальное имя; курсы имеют уникальный идентификатор и, возможно, неуникальное название; студенты посещают курс в указанном году и получают оценку.</a:t>
+            </a:r>
+            <a:r>
+              <a:rPr lang="en-US" dirty="0" smtClean="0"/>
+              <a:t> </a:t>
+            </a:r>
+            <a:r>
+              <a:rPr lang="ru-RU" dirty="0" smtClean="0"/>
+              <a:t>Какую из указанных схем вы бы порекомендовали?</a:t>
+            </a:r>
+          </a:p>
+          <a:p>
+            <a:pPr marL="0" indent="0">
+              <a:buNone/>
+            </a:pPr>
+            <a:endParaRPr lang="ru-RU" dirty="0" smtClean="0"/>
+          </a:p>
+          <a:p>
+            <a:pPr>
+              <a:buFont typeface="Arial" panose="020B0604020202020204" pitchFamily="34" charset="0"/>
+              <a:buChar char="•"/>
+            </a:pPr>
+            <a:r>
+              <a:rPr lang="en-US" dirty="0" smtClean="0"/>
+              <a:t>Took(</a:t>
+            </a:r>
+            <a:r>
+              <a:rPr lang="en-US" dirty="0" err="1" smtClean="0"/>
+              <a:t>sID</a:t>
+            </a:r>
+            <a:r>
+              <a:rPr lang="en-US" dirty="0" smtClean="0"/>
+              <a:t>, name, </a:t>
+            </a:r>
+            <a:r>
+              <a:rPr lang="en-US" dirty="0" err="1" smtClean="0"/>
+              <a:t>courseID</a:t>
+            </a:r>
+            <a:r>
+              <a:rPr lang="en-US" dirty="0" smtClean="0"/>
+              <a:t>, title, year, grade)</a:t>
+            </a:r>
+          </a:p>
+          <a:p>
+            <a:pPr>
+              <a:buFont typeface="Arial" panose="020B0604020202020204" pitchFamily="34" charset="0"/>
+              <a:buChar char="•"/>
+            </a:pPr>
+            <a:r>
+              <a:rPr lang="en-US" dirty="0" smtClean="0"/>
+              <a:t>Course(</a:t>
+            </a:r>
+            <a:r>
+              <a:rPr lang="en-US" dirty="0" err="1" smtClean="0"/>
+              <a:t>courseID</a:t>
+            </a:r>
+            <a:r>
+              <a:rPr lang="en-US" dirty="0" smtClean="0"/>
+              <a:t>, title, year), Took (</a:t>
+            </a:r>
+            <a:r>
+              <a:rPr lang="en-US" dirty="0" err="1" smtClean="0"/>
+              <a:t>sID</a:t>
+            </a:r>
+            <a:r>
+              <a:rPr lang="en-US" dirty="0" smtClean="0"/>
+              <a:t>, </a:t>
+            </a:r>
+            <a:r>
+              <a:rPr lang="en-US" dirty="0" err="1" smtClean="0"/>
+              <a:t>courseID</a:t>
+            </a:r>
+            <a:r>
+              <a:rPr lang="en-US" dirty="0" smtClean="0"/>
+              <a:t>, grade)</a:t>
+            </a:r>
+          </a:p>
+          <a:p>
+            <a:pPr>
+              <a:buFont typeface="Arial" panose="020B0604020202020204" pitchFamily="34" charset="0"/>
+              <a:buChar char="•"/>
+            </a:pPr>
+            <a:r>
+              <a:rPr lang="en-US" dirty="0" smtClean="0"/>
+              <a:t>Student(</a:t>
+            </a:r>
+            <a:r>
+              <a:rPr lang="en-US" dirty="0" err="1" smtClean="0"/>
+              <a:t>sID</a:t>
+            </a:r>
+            <a:r>
+              <a:rPr lang="en-US" dirty="0" smtClean="0"/>
+              <a:t>, name), Course(</a:t>
+            </a:r>
+            <a:r>
+              <a:rPr lang="en-US" dirty="0" err="1" smtClean="0"/>
+              <a:t>courseID</a:t>
+            </a:r>
+            <a:r>
+              <a:rPr lang="en-US" dirty="0" smtClean="0"/>
+              <a:t>, title), Took(</a:t>
+            </a:r>
+            <a:r>
+              <a:rPr lang="en-US" dirty="0" err="1" smtClean="0"/>
+              <a:t>sID</a:t>
+            </a:r>
+            <a:r>
+              <a:rPr lang="en-US" dirty="0" smtClean="0"/>
+              <a:t>, </a:t>
+            </a:r>
+            <a:r>
+              <a:rPr lang="en-US" dirty="0" err="1" smtClean="0"/>
+              <a:t>courseID</a:t>
+            </a:r>
+            <a:r>
+              <a:rPr lang="en-US" dirty="0" smtClean="0"/>
+              <a:t>, year, grade)</a:t>
+            </a:r>
+          </a:p>
+          <a:p>
+            <a:pPr>
+              <a:buFont typeface="Arial" panose="020B0604020202020204" pitchFamily="34" charset="0"/>
+              <a:buChar char="•"/>
+            </a:pPr>
+            <a:r>
+              <a:rPr lang="en-US" dirty="0" smtClean="0"/>
+              <a:t>Student(</a:t>
+            </a:r>
+            <a:r>
+              <a:rPr lang="en-US" dirty="0" err="1" smtClean="0"/>
+              <a:t>sID</a:t>
+            </a:r>
+            <a:r>
+              <a:rPr lang="en-US" dirty="0" smtClean="0"/>
+              <a:t>, name), Course(</a:t>
+            </a:r>
+            <a:r>
+              <a:rPr lang="en-US" dirty="0" err="1" smtClean="0"/>
+              <a:t>courseID</a:t>
+            </a:r>
+            <a:r>
+              <a:rPr lang="en-US" dirty="0" smtClean="0"/>
+              <a:t>, title), Took(name, title, year, grade)</a:t>
+            </a:r>
+            <a:endParaRPr lang="ru-RU" dirty="0" smtClean="0"/>
+          </a:p>
+          <a:p>
+            <a:pPr>
+              <a:buFont typeface="Arial" panose="020B0604020202020204" pitchFamily="34" charset="0"/>
+              <a:buChar char="•"/>
+            </a:pPr>
+            <a:endParaRPr lang="en-US" dirty="0"/>
+          </a:p>
+        </p:txBody>
+      </p:sp>
+    </p:spTree>
+    <p:extLst>
+      <p:ext uri="{BB962C8B-B14F-4D97-AF65-F5344CB8AC3E}">
+        <p14:creationId xmlns:p14="http://schemas.microsoft.com/office/powerpoint/2010/main" val="490159225"/>
+      </p:ext>
+    </p:extLst>
+  </p:cSld>
+  <p:clrMapOvr>
+    <a:masterClrMapping/>
+  </p:clrMapOvr>
+  <p:timing>
+    <p:tnLst>
+      <p:par>
+        <p:cTn id="1" dur="indefinite" restart="never" nodeType="tmRoot"/>
+      </p:par>
+    </p:tnLst>
+  </p:timing>
+</p:sld>
+</file>
+
+<file path=ppt/slides/slide15.xml><?xml version="1.0" encoding="utf-8"?>
+<p:sld xmlns:a="http://schemas.openxmlformats.org/drawingml/2006/main" xmlns:r="http://schemas.openxmlformats.org/officeDocument/2006/relationships" xmlns:p="http://schemas.openxmlformats.org/presentationml/2006/main">
+  <p:cSld>
+    <p:spTree>
+      <p:nvGrpSpPr>
+        <p:cNvPr id="1" name=""/>
+        <p:cNvGrpSpPr/>
+        <p:nvPr/>
+      </p:nvGrpSpPr>
+      <p:grpSpPr>
+        <a:xfrm>
+          <a:off x="0" y="0"/>
+          <a:ext cx="0" cy="0"/>
+          <a:chOff x="0" y="0"/>
+          <a:chExt cx="0" cy="0"/>
+        </a:xfrm>
+      </p:grpSpPr>
+      <p:sp>
+        <p:nvSpPr>
+          <p:cNvPr id="2" name="Title 1"/>
+          <p:cNvSpPr>
+            <a:spLocks noGrp="1"/>
+          </p:cNvSpPr>
+          <p:nvPr>
+            <p:ph type="title"/>
+          </p:nvPr>
+        </p:nvSpPr>
+        <p:spPr/>
+        <p:txBody>
+          <a:bodyPr/>
+          <a:lstStyle/>
+          <a:p>
+            <a:r>
+              <a:rPr lang="ru-RU" dirty="0" smtClean="0"/>
+              <a:t>Дизайн с помощью декомпозиции</a:t>
+            </a:r>
+            <a:endParaRPr lang="en-US" dirty="0"/>
+          </a:p>
+        </p:txBody>
+      </p:sp>
+      <p:sp>
+        <p:nvSpPr>
+          <p:cNvPr id="3" name="Content Placeholder 2"/>
+          <p:cNvSpPr>
+            <a:spLocks noGrp="1"/>
+          </p:cNvSpPr>
+          <p:nvPr>
+            <p:ph idx="1"/>
+          </p:nvPr>
+        </p:nvSpPr>
+        <p:spPr>
+          <a:xfrm>
+            <a:off x="818348" y="2060898"/>
+            <a:ext cx="7511472" cy="4376972"/>
+          </a:xfrm>
+        </p:spPr>
+        <p:txBody>
+          <a:bodyPr/>
+          <a:lstStyle/>
+          <a:p>
+            <a:r>
+              <a:rPr lang="ru-RU" dirty="0" smtClean="0"/>
+              <a:t>Начинайте с </a:t>
+            </a:r>
+            <a:r>
+              <a:rPr lang="en-US" dirty="0" smtClean="0"/>
+              <a:t>“</a:t>
+            </a:r>
+            <a:r>
+              <a:rPr lang="ru-RU" dirty="0" smtClean="0"/>
+              <a:t>мега</a:t>
+            </a:r>
+            <a:r>
+              <a:rPr lang="en-US" dirty="0" smtClean="0"/>
+              <a:t>”</a:t>
+            </a:r>
+            <a:r>
+              <a:rPr lang="ru-RU" dirty="0" smtClean="0"/>
+              <a:t> отношений, в которых содержится все</a:t>
+            </a:r>
+          </a:p>
+          <a:p>
+            <a:r>
+              <a:rPr lang="ru-RU" dirty="0" smtClean="0"/>
+              <a:t>Применяйте декомпозицию, разделяйте отношения на более мелкие, содержащие вместе ту же самую информацию.</a:t>
+            </a:r>
+          </a:p>
+          <a:p>
+            <a:r>
+              <a:rPr lang="ru-RU" dirty="0" smtClean="0"/>
+              <a:t>Можно применять декомпозицию автоматически.</a:t>
+            </a:r>
+          </a:p>
+          <a:p>
+            <a:pPr marL="0" indent="0">
+              <a:buNone/>
+            </a:pPr>
+            <a:endParaRPr lang="ru-RU" dirty="0" smtClean="0"/>
+          </a:p>
+          <a:p>
+            <a:pPr marL="0" indent="0">
+              <a:buNone/>
+            </a:pPr>
+            <a:r>
+              <a:rPr lang="ru-RU" dirty="0" smtClean="0"/>
+              <a:t>Автоматическая декомпозиция:</a:t>
+            </a:r>
+          </a:p>
+          <a:p>
+            <a:pPr>
+              <a:buFont typeface="Arial" panose="020B0604020202020204" pitchFamily="34" charset="0"/>
+              <a:buChar char="•"/>
+            </a:pPr>
+            <a:r>
+              <a:rPr lang="ru-RU" dirty="0" smtClean="0"/>
+              <a:t>Мега отношения + свойства данных</a:t>
+            </a:r>
+          </a:p>
+          <a:p>
+            <a:pPr>
+              <a:buFont typeface="Arial" panose="020B0604020202020204" pitchFamily="34" charset="0"/>
+              <a:buChar char="•"/>
+            </a:pPr>
+            <a:r>
+              <a:rPr lang="ru-RU" dirty="0" smtClean="0"/>
+              <a:t>Декомпозиция системы осуществляется на основе свойств.</a:t>
+            </a:r>
+          </a:p>
+          <a:p>
+            <a:pPr>
+              <a:buFont typeface="Arial" panose="020B0604020202020204" pitchFamily="34" charset="0"/>
+              <a:buChar char="•"/>
+            </a:pPr>
+            <a:r>
+              <a:rPr lang="ru-RU" dirty="0" smtClean="0"/>
+              <a:t>Конечный набор отношений удовлетворяет </a:t>
+            </a:r>
+            <a:r>
+              <a:rPr lang="ru-RU" dirty="0" smtClean="0">
+                <a:solidFill>
+                  <a:srgbClr val="00B0F0"/>
+                </a:solidFill>
+              </a:rPr>
+              <a:t>нормальной форме</a:t>
+            </a:r>
+            <a:r>
+              <a:rPr lang="ru-RU" dirty="0" smtClean="0"/>
+              <a:t>.</a:t>
+            </a:r>
+          </a:p>
+          <a:p>
+            <a:pPr lvl="1">
+              <a:buFont typeface="Arial" panose="020B0604020202020204" pitchFamily="34" charset="0"/>
+              <a:buChar char="•"/>
+            </a:pPr>
+            <a:r>
+              <a:rPr lang="ru-RU" dirty="0" smtClean="0"/>
+              <a:t>Никаких аномалий, никакой потерянной информации.</a:t>
+            </a:r>
+            <a:endParaRPr lang="en-US" dirty="0"/>
+          </a:p>
+        </p:txBody>
+      </p:sp>
+    </p:spTree>
+    <p:extLst>
+      <p:ext uri="{BB962C8B-B14F-4D97-AF65-F5344CB8AC3E}">
+        <p14:creationId xmlns:p14="http://schemas.microsoft.com/office/powerpoint/2010/main" val="240126091"/>
+      </p:ext>
+    </p:extLst>
+  </p:cSld>
+  <p:clrMapOvr>
+    <a:masterClrMapping/>
+  </p:clrMapOvr>
+</p:sld>
+</file>
+
+<file path=ppt/slides/slide16.xml><?xml version="1.0" encoding="utf-8"?>
+<p:sld xmlns:a="http://schemas.openxmlformats.org/drawingml/2006/main" xmlns:r="http://schemas.openxmlformats.org/officeDocument/2006/relationships" xmlns:p="http://schemas.openxmlformats.org/presentationml/2006/main">
+  <p:cSld>
+    <p:spTree>
+      <p:nvGrpSpPr>
+        <p:cNvPr id="1" name=""/>
+        <p:cNvGrpSpPr/>
+        <p:nvPr/>
+      </p:nvGrpSpPr>
+      <p:grpSpPr>
+        <a:xfrm>
+          <a:off x="0" y="0"/>
+          <a:ext cx="0" cy="0"/>
+          <a:chOff x="0" y="0"/>
+          <a:chExt cx="0" cy="0"/>
+        </a:xfrm>
+      </p:grpSpPr>
+      <p:sp>
+        <p:nvSpPr>
+          <p:cNvPr id="2" name="Title 1"/>
+          <p:cNvSpPr>
+            <a:spLocks noGrp="1"/>
+          </p:cNvSpPr>
+          <p:nvPr>
+            <p:ph type="title"/>
+          </p:nvPr>
+        </p:nvSpPr>
+        <p:spPr/>
+        <p:txBody>
+          <a:bodyPr/>
+          <a:lstStyle/>
+          <a:p>
+            <a:r>
+              <a:rPr lang="ru-RU" dirty="0" smtClean="0"/>
+              <a:t>Свойства и нормальные формы</a:t>
+            </a:r>
+            <a:endParaRPr lang="en-US" dirty="0"/>
+          </a:p>
+        </p:txBody>
+      </p:sp>
+      <p:sp>
+        <p:nvSpPr>
+          <p:cNvPr id="3" name="Content Placeholder 2"/>
+          <p:cNvSpPr>
+            <a:spLocks noGrp="1"/>
+          </p:cNvSpPr>
+          <p:nvPr>
+            <p:ph idx="1"/>
+          </p:nvPr>
+        </p:nvSpPr>
+        <p:spPr/>
+        <p:txBody>
+          <a:bodyPr/>
+          <a:lstStyle/>
+          <a:p>
+            <a:r>
+              <a:rPr lang="ru-RU" dirty="0" smtClean="0"/>
+              <a:t>Задаем функциональные зависимости =</a:t>
+            </a:r>
+            <a:r>
+              <a:rPr lang="en-US" dirty="0" smtClean="0"/>
+              <a:t>&gt; </a:t>
+            </a:r>
+            <a:r>
+              <a:rPr lang="ru-RU" dirty="0" smtClean="0"/>
+              <a:t>Система генерирует дизайн, удовлетворяющий </a:t>
+            </a:r>
+            <a:r>
+              <a:rPr lang="ru-RU" dirty="0" smtClean="0">
+                <a:solidFill>
+                  <a:srgbClr val="00B0F0"/>
+                </a:solidFill>
+              </a:rPr>
+              <a:t>нормальной форме Бойса-Кодда</a:t>
+            </a:r>
+            <a:r>
+              <a:rPr lang="ru-RU" dirty="0" smtClean="0"/>
+              <a:t>.</a:t>
+            </a:r>
+          </a:p>
+          <a:p>
+            <a:r>
+              <a:rPr lang="ru-RU" dirty="0" smtClean="0"/>
+              <a:t>Многозначные зависимости =</a:t>
+            </a:r>
+            <a:r>
+              <a:rPr lang="en-US" dirty="0" smtClean="0"/>
+              <a:t>&gt; </a:t>
+            </a:r>
+            <a:r>
+              <a:rPr lang="ru-RU" dirty="0" smtClean="0">
+                <a:solidFill>
+                  <a:srgbClr val="00B0F0"/>
+                </a:solidFill>
+              </a:rPr>
+              <a:t>четвертая нормальная форма</a:t>
+            </a:r>
+            <a:r>
+              <a:rPr lang="ru-RU" dirty="0" smtClean="0"/>
+              <a:t>.</a:t>
+            </a:r>
+          </a:p>
+          <a:p>
+            <a:endParaRPr lang="ru-RU" dirty="0"/>
+          </a:p>
+          <a:p>
+            <a:r>
+              <a:rPr lang="en-US" dirty="0" smtClean="0"/>
+              <a:t>1 </a:t>
+            </a:r>
+            <a:r>
+              <a:rPr lang="ru-RU" dirty="0" smtClean="0"/>
+              <a:t>нормальная форма (одно значение в каждой ячейке).</a:t>
+            </a:r>
+          </a:p>
+          <a:p>
+            <a:r>
+              <a:rPr lang="ru-RU" dirty="0" smtClean="0"/>
+              <a:t>2 нормальная форма (функ. полная зависимость неключевых атрибутов от потенциального ключа).</a:t>
+            </a:r>
+          </a:p>
+          <a:p>
+            <a:r>
+              <a:rPr lang="ru-RU" dirty="0" smtClean="0"/>
+              <a:t>3 нормальная форма (нет тразитивных ф. зависимостей).</a:t>
+            </a:r>
+          </a:p>
+          <a:p>
+            <a:r>
+              <a:rPr lang="ru-RU" dirty="0" smtClean="0"/>
+              <a:t>Нормальная форма Бойса-Кодда.</a:t>
+            </a:r>
+          </a:p>
+          <a:p>
+            <a:r>
+              <a:rPr lang="ru-RU" dirty="0" smtClean="0"/>
+              <a:t>4 нормальная форма.</a:t>
+            </a:r>
+            <a:endParaRPr lang="en-US" dirty="0"/>
+          </a:p>
+        </p:txBody>
+      </p:sp>
+    </p:spTree>
+    <p:extLst>
+      <p:ext uri="{BB962C8B-B14F-4D97-AF65-F5344CB8AC3E}">
+        <p14:creationId xmlns:p14="http://schemas.microsoft.com/office/powerpoint/2010/main" val="858631777"/>
+      </p:ext>
+    </p:extLst>
+  </p:cSld>
+  <p:clrMapOvr>
+    <a:masterClrMapping/>
+  </p:clrMapOvr>
+  <p:timing>
+    <p:tnLst>
+      <p:par>
+        <p:cTn id="1" dur="indefinite" restart="never" nodeType="tmRoot"/>
+      </p:par>
+    </p:tnLst>
+  </p:timing>
+</p:sld>
+</file>
+
+<file path=ppt/slides/slide17.xml><?xml version="1.0" encoding="utf-8"?>
+<p:sld xmlns:a="http://schemas.openxmlformats.org/drawingml/2006/main" xmlns:r="http://schemas.openxmlformats.org/officeDocument/2006/relationships" xmlns:p="http://schemas.openxmlformats.org/presentationml/2006/main">
+  <p:cSld>
+    <p:spTree>
+      <p:nvGrpSpPr>
+        <p:cNvPr id="1" name=""/>
+        <p:cNvGrpSpPr/>
+        <p:nvPr/>
+      </p:nvGrpSpPr>
+      <p:grpSpPr>
+        <a:xfrm>
+          <a:off x="0" y="0"/>
+          <a:ext cx="0" cy="0"/>
+          <a:chOff x="0" y="0"/>
+          <a:chExt cx="0" cy="0"/>
+        </a:xfrm>
+      </p:grpSpPr>
+      <p:sp>
+        <p:nvSpPr>
+          <p:cNvPr id="2" name="Title 1"/>
+          <p:cNvSpPr>
+            <a:spLocks noGrp="1"/>
+          </p:cNvSpPr>
+          <p:nvPr>
+            <p:ph type="title"/>
+          </p:nvPr>
+        </p:nvSpPr>
+        <p:spPr/>
+        <p:txBody>
+          <a:bodyPr/>
+          <a:lstStyle/>
+          <a:p>
+            <a:r>
+              <a:rPr lang="ru-RU" dirty="0" smtClean="0"/>
+              <a:t>Функциональные зависимости и </a:t>
+            </a:r>
+            <a:r>
+              <a:rPr lang="en-US" dirty="0" smtClean="0"/>
+              <a:t>BCNF</a:t>
+            </a:r>
+            <a:endParaRPr lang="en-US" dirty="0"/>
+          </a:p>
+        </p:txBody>
+      </p:sp>
+      <p:sp>
+        <p:nvSpPr>
+          <p:cNvPr id="3" name="Content Placeholder 2"/>
+          <p:cNvSpPr>
+            <a:spLocks noGrp="1"/>
+          </p:cNvSpPr>
+          <p:nvPr>
+            <p:ph idx="1"/>
+          </p:nvPr>
+        </p:nvSpPr>
+        <p:spPr>
+          <a:xfrm>
+            <a:off x="818348" y="2060898"/>
+            <a:ext cx="7511472" cy="4339902"/>
+          </a:xfrm>
+        </p:spPr>
+        <p:txBody>
+          <a:bodyPr/>
+          <a:lstStyle/>
+          <a:p>
+            <a:pPr marL="0" indent="0">
+              <a:buNone/>
+            </a:pPr>
+            <a:r>
+              <a:rPr lang="en-US" dirty="0" smtClean="0"/>
+              <a:t>APPLY(</a:t>
+            </a:r>
+            <a:r>
+              <a:rPr lang="en-US" dirty="0" err="1" smtClean="0"/>
+              <a:t>passID</a:t>
+            </a:r>
+            <a:r>
+              <a:rPr lang="en-US" dirty="0" smtClean="0"/>
+              <a:t>, </a:t>
+            </a:r>
+            <a:r>
+              <a:rPr lang="en-US" dirty="0" err="1" smtClean="0"/>
+              <a:t>sName</a:t>
+            </a:r>
+            <a:r>
+              <a:rPr lang="en-US" dirty="0" smtClean="0"/>
+              <a:t>, </a:t>
+            </a:r>
+            <a:r>
+              <a:rPr lang="en-US" dirty="0" err="1" smtClean="0"/>
+              <a:t>uName</a:t>
+            </a:r>
+            <a:r>
+              <a:rPr lang="en-US" dirty="0" smtClean="0"/>
+              <a:t>)</a:t>
+            </a:r>
+          </a:p>
+          <a:p>
+            <a:pPr>
+              <a:buFont typeface="Arial" panose="020B0604020202020204" pitchFamily="34" charset="0"/>
+              <a:buChar char="•"/>
+            </a:pPr>
+            <a:r>
+              <a:rPr lang="ru-RU" dirty="0" smtClean="0"/>
+              <a:t>Избыточность: Аномалии обновления </a:t>
+            </a:r>
+            <a:r>
+              <a:rPr lang="en-US" dirty="0" smtClean="0"/>
+              <a:t>&amp; </a:t>
+            </a:r>
+            <a:r>
+              <a:rPr lang="ru-RU" dirty="0" smtClean="0"/>
+              <a:t>удаления.</a:t>
+            </a:r>
+          </a:p>
+          <a:p>
+            <a:pPr>
+              <a:buFont typeface="Arial" panose="020B0604020202020204" pitchFamily="34" charset="0"/>
+              <a:buChar char="•"/>
+            </a:pPr>
+            <a:r>
+              <a:rPr lang="ru-RU" dirty="0" smtClean="0"/>
+              <a:t>Хранение одно пары </a:t>
+            </a:r>
+            <a:r>
+              <a:rPr lang="en-US" dirty="0" err="1" smtClean="0"/>
+              <a:t>passID-sName</a:t>
+            </a:r>
+            <a:r>
+              <a:rPr lang="ru-RU" dirty="0"/>
+              <a:t> </a:t>
+            </a:r>
+            <a:r>
+              <a:rPr lang="ru-RU" dirty="0" smtClean="0"/>
+              <a:t>для каждого колледжа.</a:t>
+            </a:r>
+          </a:p>
+          <a:p>
+            <a:pPr marL="0" indent="0">
+              <a:buNone/>
+            </a:pPr>
+            <a:endParaRPr lang="ru-RU" dirty="0"/>
+          </a:p>
+          <a:p>
+            <a:pPr marL="0" indent="0">
+              <a:buNone/>
+            </a:pPr>
+            <a:r>
+              <a:rPr lang="ru-RU" dirty="0" smtClean="0"/>
+              <a:t>Функциональная зависимость </a:t>
+            </a:r>
+            <a:r>
+              <a:rPr lang="en-US" dirty="0" err="1" smtClean="0"/>
+              <a:t>passID→sName</a:t>
+            </a:r>
+            <a:endParaRPr lang="en-US" dirty="0" smtClean="0"/>
+          </a:p>
+          <a:p>
+            <a:pPr>
+              <a:buFont typeface="Arial" panose="020B0604020202020204" pitchFamily="34" charset="0"/>
+              <a:buChar char="•"/>
+            </a:pPr>
+            <a:r>
+              <a:rPr lang="ru-RU" dirty="0" smtClean="0"/>
+              <a:t>Одинаковые </a:t>
+            </a:r>
+            <a:r>
+              <a:rPr lang="en-US" dirty="0" err="1" smtClean="0"/>
+              <a:t>passID</a:t>
+            </a:r>
+            <a:r>
+              <a:rPr lang="en-US" dirty="0" smtClean="0"/>
+              <a:t> </a:t>
+            </a:r>
+            <a:r>
+              <a:rPr lang="ru-RU" dirty="0" smtClean="0"/>
+              <a:t>имеют одинаковы</a:t>
+            </a:r>
+            <a:r>
+              <a:rPr lang="ru-RU" dirty="0"/>
+              <a:t>й</a:t>
+            </a:r>
+            <a:r>
+              <a:rPr lang="ru-RU" dirty="0" smtClean="0"/>
+              <a:t> </a:t>
+            </a:r>
+            <a:r>
+              <a:rPr lang="en-US" dirty="0" err="1" smtClean="0"/>
+              <a:t>sName</a:t>
+            </a:r>
+            <a:r>
+              <a:rPr lang="ru-RU" dirty="0" smtClean="0"/>
+              <a:t>, но не наоборот.</a:t>
+            </a:r>
+          </a:p>
+          <a:p>
+            <a:pPr>
+              <a:buFont typeface="Arial" panose="020B0604020202020204" pitchFamily="34" charset="0"/>
+              <a:buChar char="•"/>
+            </a:pPr>
+            <a:r>
+              <a:rPr lang="ru-RU" dirty="0" smtClean="0"/>
+              <a:t>Каждая пара </a:t>
+            </a:r>
+            <a:r>
+              <a:rPr lang="en-US" dirty="0" err="1" smtClean="0"/>
+              <a:t>passId</a:t>
+            </a:r>
+            <a:r>
+              <a:rPr lang="en-US" dirty="0" smtClean="0"/>
+              <a:t>,</a:t>
+            </a:r>
+            <a:r>
+              <a:rPr lang="ru-RU" dirty="0" smtClean="0"/>
+              <a:t> </a:t>
+            </a:r>
+            <a:r>
+              <a:rPr lang="en-US" dirty="0" err="1" smtClean="0"/>
+              <a:t>sName</a:t>
+            </a:r>
+            <a:r>
+              <a:rPr lang="en-US" dirty="0" smtClean="0"/>
+              <a:t> </a:t>
+            </a:r>
+            <a:r>
+              <a:rPr lang="ru-RU" dirty="0" smtClean="0"/>
+              <a:t>– хранится в единственном экземпляре.</a:t>
+            </a:r>
+          </a:p>
+          <a:p>
+            <a:pPr marL="0" indent="0">
+              <a:buNone/>
+            </a:pPr>
+            <a:endParaRPr lang="ru-RU" dirty="0"/>
+          </a:p>
+          <a:p>
+            <a:pPr marL="0" indent="0">
+              <a:buNone/>
+            </a:pPr>
+            <a:r>
+              <a:rPr lang="ru-RU" dirty="0" smtClean="0"/>
+              <a:t>Нормальная форма Бойса-Кодда: Если </a:t>
+            </a:r>
+            <a:r>
+              <a:rPr lang="en-US" dirty="0" smtClean="0"/>
+              <a:t>A→B, </a:t>
+            </a:r>
+            <a:r>
+              <a:rPr lang="ru-RU" dirty="0" smtClean="0"/>
+              <a:t>тогда </a:t>
+            </a:r>
+            <a:r>
+              <a:rPr lang="en-US" dirty="0" smtClean="0"/>
+              <a:t>A</a:t>
+            </a:r>
+            <a:r>
+              <a:rPr lang="ru-RU" dirty="0" smtClean="0"/>
+              <a:t> </a:t>
+            </a:r>
+            <a:r>
+              <a:rPr lang="en-US" dirty="0" smtClean="0"/>
+              <a:t>–</a:t>
+            </a:r>
+            <a:r>
+              <a:rPr lang="ru-RU" dirty="0" smtClean="0"/>
+              <a:t> ключ.</a:t>
+            </a:r>
+          </a:p>
+        </p:txBody>
+      </p:sp>
+    </p:spTree>
+    <p:extLst>
+      <p:ext uri="{BB962C8B-B14F-4D97-AF65-F5344CB8AC3E}">
+        <p14:creationId xmlns:p14="http://schemas.microsoft.com/office/powerpoint/2010/main" val="2969498643"/>
+      </p:ext>
+    </p:extLst>
+  </p:cSld>
+  <p:clrMapOvr>
+    <a:masterClrMapping/>
+  </p:clrMapOvr>
+  <p:timing>
+    <p:tnLst>
+      <p:par>
+        <p:cTn id="1" dur="indefinite" restart="never" nodeType="tmRoot"/>
+      </p:par>
+    </p:tnLst>
+  </p:timing>
+</p:sld>
+</file>
+
+<file path=ppt/slides/slide18.xml><?xml version="1.0" encoding="utf-8"?>
+<p:sld xmlns:a="http://schemas.openxmlformats.org/drawingml/2006/main" xmlns:r="http://schemas.openxmlformats.org/officeDocument/2006/relationships" xmlns:p="http://schemas.openxmlformats.org/presentationml/2006/main">
+  <p:cSld>
+    <p:spTree>
+      <p:nvGrpSpPr>
+        <p:cNvPr id="1" name=""/>
+        <p:cNvGrpSpPr/>
+        <p:nvPr/>
+      </p:nvGrpSpPr>
+      <p:grpSpPr>
+        <a:xfrm>
+          <a:off x="0" y="0"/>
+          <a:ext cx="0" cy="0"/>
+          <a:chOff x="0" y="0"/>
+          <a:chExt cx="0" cy="0"/>
+        </a:xfrm>
+      </p:grpSpPr>
+      <p:sp>
+        <p:nvSpPr>
+          <p:cNvPr id="2" name="Title 1"/>
+          <p:cNvSpPr>
+            <a:spLocks noGrp="1"/>
+          </p:cNvSpPr>
+          <p:nvPr>
+            <p:ph type="title"/>
+          </p:nvPr>
+        </p:nvSpPr>
+        <p:spPr/>
+        <p:txBody>
+          <a:bodyPr/>
+          <a:lstStyle/>
+          <a:p>
+            <a:r>
+              <a:rPr lang="ru-RU" dirty="0" smtClean="0"/>
+              <a:t>Функциональные зависимости и </a:t>
+            </a:r>
+            <a:r>
+              <a:rPr lang="en-US" dirty="0" smtClean="0"/>
+              <a:t>BCNF</a:t>
+            </a:r>
+            <a:endParaRPr lang="en-US" dirty="0"/>
+          </a:p>
+        </p:txBody>
+      </p:sp>
+      <p:sp>
+        <p:nvSpPr>
+          <p:cNvPr id="3" name="Content Placeholder 2"/>
+          <p:cNvSpPr>
+            <a:spLocks noGrp="1"/>
+          </p:cNvSpPr>
+          <p:nvPr>
+            <p:ph idx="1"/>
+          </p:nvPr>
+        </p:nvSpPr>
+        <p:spPr>
+          <a:xfrm>
+            <a:off x="818348" y="2060898"/>
+            <a:ext cx="7511472" cy="4797102"/>
+          </a:xfrm>
+        </p:spPr>
+        <p:txBody>
+          <a:bodyPr/>
+          <a:lstStyle/>
+          <a:p>
+            <a:pPr marL="0" indent="0">
+              <a:buNone/>
+            </a:pPr>
+            <a:r>
+              <a:rPr lang="en-US" dirty="0" smtClean="0"/>
+              <a:t>APPLY(</a:t>
+            </a:r>
+            <a:r>
+              <a:rPr lang="en-US" dirty="0" err="1" smtClean="0"/>
+              <a:t>passID</a:t>
+            </a:r>
+            <a:r>
+              <a:rPr lang="en-US" dirty="0" smtClean="0"/>
+              <a:t>, </a:t>
+            </a:r>
+            <a:r>
+              <a:rPr lang="en-US" dirty="0" err="1" smtClean="0"/>
+              <a:t>sName</a:t>
+            </a:r>
+            <a:r>
+              <a:rPr lang="en-US" dirty="0" smtClean="0"/>
+              <a:t>, </a:t>
+            </a:r>
+            <a:r>
+              <a:rPr lang="en-US" dirty="0" err="1" smtClean="0"/>
+              <a:t>uName</a:t>
+            </a:r>
+            <a:r>
+              <a:rPr lang="en-US" dirty="0" smtClean="0"/>
+              <a:t>)</a:t>
+            </a:r>
+          </a:p>
+          <a:p>
+            <a:pPr>
+              <a:buFont typeface="Arial" panose="020B0604020202020204" pitchFamily="34" charset="0"/>
+              <a:buChar char="•"/>
+            </a:pPr>
+            <a:r>
+              <a:rPr lang="ru-RU" dirty="0" smtClean="0"/>
+              <a:t>Избыточность: Аномалии обновления </a:t>
+            </a:r>
+            <a:r>
+              <a:rPr lang="en-US" dirty="0" smtClean="0"/>
+              <a:t>&amp; </a:t>
+            </a:r>
+            <a:r>
+              <a:rPr lang="ru-RU" dirty="0" smtClean="0"/>
+              <a:t>удаления.</a:t>
+            </a:r>
+          </a:p>
+          <a:p>
+            <a:pPr>
+              <a:buFont typeface="Arial" panose="020B0604020202020204" pitchFamily="34" charset="0"/>
+              <a:buChar char="•"/>
+            </a:pPr>
+            <a:r>
+              <a:rPr lang="ru-RU" dirty="0" smtClean="0"/>
+              <a:t>Хранение одно пары </a:t>
+            </a:r>
+            <a:r>
+              <a:rPr lang="en-US" dirty="0" err="1" smtClean="0"/>
+              <a:t>passID-sName</a:t>
+            </a:r>
+            <a:r>
+              <a:rPr lang="ru-RU" dirty="0"/>
+              <a:t> </a:t>
+            </a:r>
+            <a:r>
+              <a:rPr lang="ru-RU" dirty="0" smtClean="0"/>
+              <a:t>для каждого колледжа.</a:t>
+            </a:r>
+          </a:p>
+          <a:p>
+            <a:pPr marL="0" indent="0">
+              <a:buNone/>
+            </a:pPr>
+            <a:endParaRPr lang="ru-RU" dirty="0"/>
+          </a:p>
+          <a:p>
+            <a:pPr marL="0" indent="0">
+              <a:buNone/>
+            </a:pPr>
+            <a:r>
+              <a:rPr lang="ru-RU" dirty="0" smtClean="0"/>
+              <a:t>Функциональная зависимость </a:t>
+            </a:r>
+            <a:r>
+              <a:rPr lang="en-US" dirty="0" err="1" smtClean="0"/>
+              <a:t>passID→sName</a:t>
+            </a:r>
+            <a:endParaRPr lang="en-US" dirty="0" smtClean="0"/>
+          </a:p>
+          <a:p>
+            <a:pPr>
+              <a:buFont typeface="Arial" panose="020B0604020202020204" pitchFamily="34" charset="0"/>
+              <a:buChar char="•"/>
+            </a:pPr>
+            <a:r>
+              <a:rPr lang="ru-RU" dirty="0" smtClean="0"/>
+              <a:t>Одинаковые </a:t>
+            </a:r>
+            <a:r>
+              <a:rPr lang="en-US" dirty="0" err="1" smtClean="0"/>
+              <a:t>passID</a:t>
+            </a:r>
+            <a:r>
+              <a:rPr lang="en-US" dirty="0" smtClean="0"/>
+              <a:t> </a:t>
+            </a:r>
+            <a:r>
+              <a:rPr lang="ru-RU" dirty="0" smtClean="0"/>
+              <a:t>имеют одинаковы</a:t>
+            </a:r>
+            <a:r>
+              <a:rPr lang="ru-RU" dirty="0"/>
+              <a:t>й</a:t>
+            </a:r>
+            <a:r>
+              <a:rPr lang="ru-RU" dirty="0" smtClean="0"/>
+              <a:t> </a:t>
+            </a:r>
+            <a:r>
+              <a:rPr lang="en-US" dirty="0" err="1" smtClean="0"/>
+              <a:t>sName</a:t>
+            </a:r>
+            <a:r>
+              <a:rPr lang="ru-RU" dirty="0" smtClean="0"/>
+              <a:t>, но не наоборот.</a:t>
+            </a:r>
+          </a:p>
+          <a:p>
+            <a:pPr>
+              <a:buFont typeface="Arial" panose="020B0604020202020204" pitchFamily="34" charset="0"/>
+              <a:buChar char="•"/>
+            </a:pPr>
+            <a:r>
+              <a:rPr lang="ru-RU" dirty="0" smtClean="0"/>
+              <a:t>Каждая пара </a:t>
+            </a:r>
+            <a:r>
+              <a:rPr lang="en-US" dirty="0" err="1" smtClean="0"/>
+              <a:t>passId</a:t>
+            </a:r>
+            <a:r>
+              <a:rPr lang="en-US" dirty="0" smtClean="0"/>
+              <a:t>,</a:t>
+            </a:r>
+            <a:r>
+              <a:rPr lang="ru-RU" dirty="0" smtClean="0"/>
+              <a:t> </a:t>
+            </a:r>
+            <a:r>
+              <a:rPr lang="en-US" dirty="0" err="1" smtClean="0"/>
+              <a:t>sName</a:t>
+            </a:r>
+            <a:r>
+              <a:rPr lang="en-US" dirty="0" smtClean="0"/>
+              <a:t> </a:t>
+            </a:r>
+            <a:r>
+              <a:rPr lang="ru-RU" dirty="0" smtClean="0"/>
+              <a:t>– хранится в единственном экземпляре.</a:t>
+            </a:r>
+          </a:p>
+          <a:p>
+            <a:pPr marL="0" indent="0">
+              <a:buNone/>
+            </a:pPr>
+            <a:endParaRPr lang="ru-RU" dirty="0"/>
+          </a:p>
+          <a:p>
+            <a:pPr marL="0" indent="0">
+              <a:buNone/>
+            </a:pPr>
+            <a:r>
+              <a:rPr lang="ru-RU" dirty="0" smtClean="0"/>
+              <a:t>Нормальная форма Бойса-Кодда: Если </a:t>
+            </a:r>
+            <a:r>
+              <a:rPr lang="en-US" dirty="0" smtClean="0"/>
+              <a:t>A→B, </a:t>
+            </a:r>
+            <a:r>
+              <a:rPr lang="ru-RU" dirty="0" smtClean="0"/>
+              <a:t>тогда </a:t>
+            </a:r>
+            <a:r>
+              <a:rPr lang="en-US" dirty="0" smtClean="0"/>
+              <a:t>A</a:t>
+            </a:r>
+            <a:r>
+              <a:rPr lang="ru-RU" dirty="0" smtClean="0"/>
+              <a:t> </a:t>
+            </a:r>
+            <a:r>
+              <a:rPr lang="en-US" dirty="0" smtClean="0"/>
+              <a:t>–</a:t>
+            </a:r>
+            <a:r>
+              <a:rPr lang="ru-RU" dirty="0" smtClean="0"/>
+              <a:t> ключ.</a:t>
+            </a:r>
+          </a:p>
+          <a:p>
+            <a:pPr marL="0" indent="0">
+              <a:buNone/>
+            </a:pPr>
+            <a:r>
+              <a:rPr lang="ru-RU" dirty="0" smtClean="0"/>
+              <a:t>Декомпозиция: </a:t>
+            </a:r>
+            <a:r>
+              <a:rPr lang="en-US" dirty="0" smtClean="0"/>
+              <a:t>Student(</a:t>
+            </a:r>
+            <a:r>
+              <a:rPr lang="en-US" dirty="0" err="1" smtClean="0"/>
+              <a:t>passID</a:t>
+            </a:r>
+            <a:r>
+              <a:rPr lang="en-US" dirty="0" smtClean="0"/>
+              <a:t>, </a:t>
+            </a:r>
+            <a:r>
+              <a:rPr lang="en-US" dirty="0" err="1" smtClean="0"/>
+              <a:t>sName</a:t>
+            </a:r>
+            <a:r>
+              <a:rPr lang="en-US" dirty="0" smtClean="0"/>
+              <a:t>), Apply(</a:t>
+            </a:r>
+            <a:r>
+              <a:rPr lang="en-US" dirty="0" err="1" smtClean="0"/>
+              <a:t>passID</a:t>
+            </a:r>
+            <a:r>
+              <a:rPr lang="en-US" dirty="0" smtClean="0"/>
+              <a:t>, </a:t>
+            </a:r>
+            <a:r>
+              <a:rPr lang="en-US" dirty="0" err="1" smtClean="0"/>
+              <a:t>uName</a:t>
+            </a:r>
+            <a:r>
+              <a:rPr lang="en-US" dirty="0" smtClean="0"/>
+              <a:t>)</a:t>
+            </a:r>
+            <a:endParaRPr lang="ru-RU" dirty="0" smtClean="0"/>
+          </a:p>
+        </p:txBody>
+      </p:sp>
+    </p:spTree>
+    <p:extLst>
+      <p:ext uri="{BB962C8B-B14F-4D97-AF65-F5344CB8AC3E}">
+        <p14:creationId xmlns:p14="http://schemas.microsoft.com/office/powerpoint/2010/main" val="2054620475"/>
+      </p:ext>
+    </p:extLst>
+  </p:cSld>
+  <p:clrMapOvr>
+    <a:masterClrMapping/>
+  </p:clrMapOvr>
+  <p:timing>
+    <p:tnLst>
+      <p:par>
+        <p:cTn id="1" dur="indefinite" restart="never" nodeType="tmRoot"/>
+      </p:par>
+    </p:tnLst>
+  </p:timing>
+</p:sld>
+</file>
+
+<file path=ppt/slides/slide19.xml><?xml version="1.0" encoding="utf-8"?>
+<p:sld xmlns:a="http://schemas.openxmlformats.org/drawingml/2006/main" xmlns:r="http://schemas.openxmlformats.org/officeDocument/2006/relationships" xmlns:p="http://schemas.openxmlformats.org/presentationml/2006/main">
+  <p:cSld>
+    <p:spTree>
+      <p:nvGrpSpPr>
+        <p:cNvPr id="1" name=""/>
+        <p:cNvGrpSpPr/>
+        <p:nvPr/>
+      </p:nvGrpSpPr>
+      <p:grpSpPr>
+        <a:xfrm>
+          <a:off x="0" y="0"/>
+          <a:ext cx="0" cy="0"/>
+          <a:chOff x="0" y="0"/>
+          <a:chExt cx="0" cy="0"/>
+        </a:xfrm>
+      </p:grpSpPr>
+      <p:sp>
+        <p:nvSpPr>
+          <p:cNvPr id="2" name="Title 1"/>
+          <p:cNvSpPr>
+            <a:spLocks noGrp="1"/>
+          </p:cNvSpPr>
+          <p:nvPr>
+            <p:ph type="title"/>
+          </p:nvPr>
+        </p:nvSpPr>
+        <p:spPr/>
+        <p:txBody>
+          <a:bodyPr/>
+          <a:lstStyle/>
+          <a:p>
+            <a:r>
+              <a:rPr lang="ru-RU" dirty="0" smtClean="0"/>
+              <a:t>Вопрос</a:t>
+            </a:r>
+            <a:endParaRPr lang="en-US" dirty="0"/>
+          </a:p>
+        </p:txBody>
+      </p:sp>
+      <p:sp>
+        <p:nvSpPr>
+          <p:cNvPr id="3" name="Content Placeholder 2"/>
+          <p:cNvSpPr>
+            <a:spLocks noGrp="1"/>
+          </p:cNvSpPr>
+          <p:nvPr>
+            <p:ph idx="1"/>
+          </p:nvPr>
+        </p:nvSpPr>
+        <p:spPr/>
+        <p:txBody>
+          <a:bodyPr/>
+          <a:lstStyle/>
+          <a:p>
+            <a:pPr marL="0" indent="0">
+              <a:buNone/>
+            </a:pPr>
+            <a:r>
+              <a:rPr lang="ru-RU" dirty="0" smtClean="0"/>
+              <a:t>Рассмотрим отношение </a:t>
+            </a:r>
+            <a:r>
+              <a:rPr lang="en-US" dirty="0" smtClean="0"/>
+              <a:t>Took(</a:t>
+            </a:r>
+            <a:r>
+              <a:rPr lang="en-US" dirty="0" err="1" smtClean="0"/>
+              <a:t>sID</a:t>
+            </a:r>
+            <a:r>
+              <a:rPr lang="en-US" dirty="0" smtClean="0"/>
+              <a:t>, name, </a:t>
+            </a:r>
+            <a:r>
+              <a:rPr lang="en-US" dirty="0" err="1" smtClean="0"/>
+              <a:t>courseID</a:t>
+            </a:r>
+            <a:r>
+              <a:rPr lang="en-US" dirty="0" smtClean="0"/>
+              <a:t>, title).</a:t>
+            </a:r>
+            <a:r>
+              <a:rPr lang="ru-RU" dirty="0" smtClean="0"/>
+              <a:t> У каждого студента – уникальный </a:t>
+            </a:r>
+            <a:r>
+              <a:rPr lang="en-US" dirty="0" smtClean="0"/>
+              <a:t>ID </a:t>
+            </a:r>
+            <a:r>
+              <a:rPr lang="ru-RU" dirty="0" smtClean="0"/>
+              <a:t>и (вероятно неуникальное) имя </a:t>
+            </a:r>
+            <a:r>
+              <a:rPr lang="en-US" dirty="0" smtClean="0"/>
+              <a:t>name; </a:t>
+            </a:r>
+            <a:r>
+              <a:rPr lang="ru-RU" dirty="0" smtClean="0"/>
+              <a:t>у каждого курса уникальный идентификатор </a:t>
+            </a:r>
+            <a:r>
+              <a:rPr lang="en-US" dirty="0" err="1" smtClean="0"/>
+              <a:t>courseID</a:t>
+            </a:r>
+            <a:r>
+              <a:rPr lang="en-US" dirty="0" smtClean="0"/>
+              <a:t> </a:t>
+            </a:r>
+            <a:r>
+              <a:rPr lang="ru-RU" dirty="0" smtClean="0"/>
+              <a:t>и (вероятно неуникальное) название. Каждый кортеж в отношении отражает тот факт, что студент закончил данный курс. Какие из функциональных зависимостей формируют отношение </a:t>
+            </a:r>
+            <a:r>
+              <a:rPr lang="en-US" dirty="0" smtClean="0"/>
+              <a:t>Took?</a:t>
+            </a:r>
+          </a:p>
+          <a:p>
+            <a:r>
+              <a:rPr lang="en-US" dirty="0" err="1" smtClean="0"/>
+              <a:t>sID</a:t>
+            </a:r>
+            <a:r>
+              <a:rPr lang="en-US" dirty="0"/>
+              <a:t> → </a:t>
+            </a:r>
+            <a:r>
+              <a:rPr lang="en-US" dirty="0" err="1" smtClean="0"/>
+              <a:t>courseID</a:t>
+            </a:r>
+            <a:endParaRPr lang="en-US" dirty="0" smtClean="0"/>
+          </a:p>
+          <a:p>
+            <a:r>
+              <a:rPr lang="en-US" dirty="0" err="1" smtClean="0"/>
+              <a:t>sID</a:t>
+            </a:r>
+            <a:r>
+              <a:rPr lang="en-US" dirty="0"/>
+              <a:t> → </a:t>
+            </a:r>
+            <a:r>
+              <a:rPr lang="en-US" dirty="0" smtClean="0"/>
+              <a:t>name, </a:t>
+            </a:r>
+            <a:r>
+              <a:rPr lang="en-US" dirty="0" err="1" smtClean="0"/>
+              <a:t>courseID</a:t>
+            </a:r>
+            <a:r>
+              <a:rPr lang="en-US" dirty="0"/>
+              <a:t> → </a:t>
+            </a:r>
+            <a:r>
+              <a:rPr lang="en-US" dirty="0" smtClean="0"/>
+              <a:t>title</a:t>
+            </a:r>
+          </a:p>
+          <a:p>
+            <a:r>
+              <a:rPr lang="en-US" dirty="0" smtClean="0"/>
+              <a:t>name</a:t>
+            </a:r>
+            <a:r>
+              <a:rPr lang="en-US" dirty="0"/>
+              <a:t> → </a:t>
+            </a:r>
+            <a:r>
+              <a:rPr lang="en-US" dirty="0" err="1" smtClean="0"/>
+              <a:t>sID</a:t>
+            </a:r>
+            <a:r>
+              <a:rPr lang="en-US" dirty="0" smtClean="0"/>
+              <a:t>, title</a:t>
+            </a:r>
+            <a:r>
+              <a:rPr lang="en-US" dirty="0"/>
+              <a:t> → </a:t>
+            </a:r>
+            <a:r>
+              <a:rPr lang="en-US" dirty="0" err="1" smtClean="0"/>
+              <a:t>courseID</a:t>
+            </a:r>
+            <a:endParaRPr lang="en-US" dirty="0" smtClean="0"/>
+          </a:p>
+          <a:p>
+            <a:r>
+              <a:rPr lang="en-US" dirty="0" err="1" smtClean="0"/>
+              <a:t>courseID</a:t>
+            </a:r>
+            <a:r>
+              <a:rPr lang="en-US" dirty="0"/>
+              <a:t> → </a:t>
+            </a:r>
+            <a:r>
+              <a:rPr lang="en-US" dirty="0" err="1" smtClean="0"/>
+              <a:t>sID</a:t>
+            </a:r>
+            <a:endParaRPr lang="en-US" dirty="0"/>
+          </a:p>
+        </p:txBody>
+      </p:sp>
+    </p:spTree>
+    <p:extLst>
+      <p:ext uri="{BB962C8B-B14F-4D97-AF65-F5344CB8AC3E}">
+        <p14:creationId xmlns:p14="http://schemas.microsoft.com/office/powerpoint/2010/main" val="2571384061"/>
+      </p:ext>
+    </p:extLst>
+  </p:cSld>
+  <p:clrMapOvr>
+    <a:masterClrMapping/>
+  </p:clrMapOvr>
+  <p:timing>
+    <p:tnLst>
+      <p:par>
+        <p:cTn id="1" dur="indefinite" restart="never" nodeType="tmRoot"/>
+      </p:par>
+    </p:tnLst>
+  </p:timing>
+</p:sld>
+</file>
+
 <file path=ppt/slides/slide2.xml><?xml version="1.0" encoding="utf-8"?>
 <p:sld xmlns:a="http://schemas.openxmlformats.org/drawingml/2006/main" xmlns:r="http://schemas.openxmlformats.org/officeDocument/2006/relationships" xmlns:p="http://schemas.openxmlformats.org/presentationml/2006/main">
   <p:cSld>
@@ -7116,6 +8996,1482 @@
   <p:clrMapOvr>
     <a:masterClrMapping/>
   </p:clrMapOvr>
+</p:sld>
+</file>
+
+<file path=ppt/slides/slide20.xml><?xml version="1.0" encoding="utf-8"?>
+<p:sld xmlns:a="http://schemas.openxmlformats.org/drawingml/2006/main" xmlns:r="http://schemas.openxmlformats.org/officeDocument/2006/relationships" xmlns:p="http://schemas.openxmlformats.org/presentationml/2006/main">
+  <p:cSld>
+    <p:spTree>
+      <p:nvGrpSpPr>
+        <p:cNvPr id="1" name=""/>
+        <p:cNvGrpSpPr/>
+        <p:nvPr/>
+      </p:nvGrpSpPr>
+      <p:grpSpPr>
+        <a:xfrm>
+          <a:off x="0" y="0"/>
+          <a:ext cx="0" cy="0"/>
+          <a:chOff x="0" y="0"/>
+          <a:chExt cx="0" cy="0"/>
+        </a:xfrm>
+      </p:grpSpPr>
+      <p:sp>
+        <p:nvSpPr>
+          <p:cNvPr id="2" name="Title 1"/>
+          <p:cNvSpPr>
+            <a:spLocks noGrp="1"/>
+          </p:cNvSpPr>
+          <p:nvPr>
+            <p:ph type="title"/>
+          </p:nvPr>
+        </p:nvSpPr>
+        <p:spPr/>
+        <p:txBody>
+          <a:bodyPr/>
+          <a:lstStyle/>
+          <a:p>
+            <a:r>
+              <a:rPr lang="ru-RU" dirty="0" smtClean="0"/>
+              <a:t>Вопрос</a:t>
+            </a:r>
+            <a:endParaRPr lang="en-US" dirty="0"/>
+          </a:p>
+        </p:txBody>
+      </p:sp>
+      <p:sp>
+        <p:nvSpPr>
+          <p:cNvPr id="3" name="Content Placeholder 2"/>
+          <p:cNvSpPr>
+            <a:spLocks noGrp="1"/>
+          </p:cNvSpPr>
+          <p:nvPr>
+            <p:ph idx="1"/>
+          </p:nvPr>
+        </p:nvSpPr>
+        <p:spPr/>
+        <p:txBody>
+          <a:bodyPr/>
+          <a:lstStyle/>
+          <a:p>
+            <a:pPr marL="0" indent="0">
+              <a:buNone/>
+            </a:pPr>
+            <a:r>
+              <a:rPr lang="ru-RU" dirty="0" smtClean="0"/>
+              <a:t>Рассмотрим отношение </a:t>
+            </a:r>
+            <a:r>
+              <a:rPr lang="en-US" dirty="0" smtClean="0"/>
+              <a:t>Took(</a:t>
+            </a:r>
+            <a:r>
+              <a:rPr lang="en-US" dirty="0" err="1" smtClean="0"/>
+              <a:t>sID</a:t>
+            </a:r>
+            <a:r>
+              <a:rPr lang="en-US" dirty="0" smtClean="0"/>
+              <a:t>, name, </a:t>
+            </a:r>
+            <a:r>
+              <a:rPr lang="en-US" dirty="0" err="1" smtClean="0"/>
+              <a:t>courseID</a:t>
+            </a:r>
+            <a:r>
+              <a:rPr lang="en-US" dirty="0" smtClean="0"/>
+              <a:t>, title) </a:t>
+            </a:r>
+            <a:r>
+              <a:rPr lang="ru-RU" dirty="0" smtClean="0"/>
+              <a:t>с функциональными зависимостями</a:t>
+            </a:r>
+          </a:p>
+          <a:p>
+            <a:r>
+              <a:rPr lang="en-US" dirty="0" err="1" smtClean="0"/>
+              <a:t>sID</a:t>
+            </a:r>
+            <a:r>
+              <a:rPr lang="en-US" dirty="0"/>
+              <a:t> </a:t>
+            </a:r>
+            <a:r>
+              <a:rPr lang="en-US" dirty="0" smtClean="0"/>
+              <a:t>→ name</a:t>
+            </a:r>
+          </a:p>
+          <a:p>
+            <a:r>
+              <a:rPr lang="en-US" dirty="0" err="1" smtClean="0"/>
+              <a:t>courseID</a:t>
+            </a:r>
+            <a:r>
+              <a:rPr lang="en-US" dirty="0"/>
+              <a:t> </a:t>
+            </a:r>
+            <a:r>
+              <a:rPr lang="en-US" dirty="0" smtClean="0"/>
+              <a:t>→ title</a:t>
+            </a:r>
+          </a:p>
+          <a:p>
+            <a:pPr marL="0" indent="0">
+              <a:buNone/>
+            </a:pPr>
+            <a:endParaRPr lang="en-US" dirty="0" smtClean="0"/>
+          </a:p>
+          <a:p>
+            <a:pPr marL="0" indent="0">
+              <a:buNone/>
+            </a:pPr>
+            <a:r>
+              <a:rPr lang="ru-RU" dirty="0"/>
+              <a:t>Н</a:t>
+            </a:r>
+            <a:r>
+              <a:rPr lang="ru-RU" dirty="0" smtClean="0"/>
+              <a:t>аходится ли </a:t>
+            </a:r>
+            <a:r>
+              <a:rPr lang="en-US" dirty="0" smtClean="0"/>
+              <a:t>Took </a:t>
+            </a:r>
+            <a:r>
+              <a:rPr lang="ru-RU" dirty="0" smtClean="0"/>
+              <a:t>в Нормальной Форме Бойса-Кодда?</a:t>
+            </a:r>
+          </a:p>
+        </p:txBody>
+      </p:sp>
+    </p:spTree>
+    <p:extLst>
+      <p:ext uri="{BB962C8B-B14F-4D97-AF65-F5344CB8AC3E}">
+        <p14:creationId xmlns:p14="http://schemas.microsoft.com/office/powerpoint/2010/main" val="1528381320"/>
+      </p:ext>
+    </p:extLst>
+  </p:cSld>
+  <p:clrMapOvr>
+    <a:masterClrMapping/>
+  </p:clrMapOvr>
+  <p:timing>
+    <p:tnLst>
+      <p:par>
+        <p:cTn id="1" dur="indefinite" restart="never" nodeType="tmRoot"/>
+      </p:par>
+    </p:tnLst>
+  </p:timing>
+</p:sld>
+</file>
+
+<file path=ppt/slides/slide21.xml><?xml version="1.0" encoding="utf-8"?>
+<p:sld xmlns:a="http://schemas.openxmlformats.org/drawingml/2006/main" xmlns:r="http://schemas.openxmlformats.org/officeDocument/2006/relationships" xmlns:p="http://schemas.openxmlformats.org/presentationml/2006/main">
+  <p:cSld>
+    <p:spTree>
+      <p:nvGrpSpPr>
+        <p:cNvPr id="1" name=""/>
+        <p:cNvGrpSpPr/>
+        <p:nvPr/>
+      </p:nvGrpSpPr>
+      <p:grpSpPr>
+        <a:xfrm>
+          <a:off x="0" y="0"/>
+          <a:ext cx="0" cy="0"/>
+          <a:chOff x="0" y="0"/>
+          <a:chExt cx="0" cy="0"/>
+        </a:xfrm>
+      </p:grpSpPr>
+      <p:sp>
+        <p:nvSpPr>
+          <p:cNvPr id="2" name="Title 1"/>
+          <p:cNvSpPr>
+            <a:spLocks noGrp="1"/>
+          </p:cNvSpPr>
+          <p:nvPr>
+            <p:ph type="title"/>
+          </p:nvPr>
+        </p:nvSpPr>
+        <p:spPr/>
+        <p:txBody>
+          <a:bodyPr/>
+          <a:lstStyle/>
+          <a:p>
+            <a:r>
+              <a:rPr lang="ru-RU" dirty="0" smtClean="0"/>
+              <a:t>Вопрос</a:t>
+            </a:r>
+            <a:endParaRPr lang="en-US" dirty="0"/>
+          </a:p>
+        </p:txBody>
+      </p:sp>
+      <p:sp>
+        <p:nvSpPr>
+          <p:cNvPr id="3" name="Content Placeholder 2"/>
+          <p:cNvSpPr>
+            <a:spLocks noGrp="1"/>
+          </p:cNvSpPr>
+          <p:nvPr>
+            <p:ph idx="1"/>
+          </p:nvPr>
+        </p:nvSpPr>
+        <p:spPr/>
+        <p:txBody>
+          <a:bodyPr/>
+          <a:lstStyle/>
+          <a:p>
+            <a:pPr marL="0" indent="0">
+              <a:buNone/>
+            </a:pPr>
+            <a:r>
+              <a:rPr lang="ru-RU" dirty="0" smtClean="0"/>
+              <a:t>Рассмотрим отношение </a:t>
+            </a:r>
+            <a:r>
+              <a:rPr lang="en-US" dirty="0" smtClean="0"/>
+              <a:t>Took(</a:t>
+            </a:r>
+            <a:r>
+              <a:rPr lang="en-US" dirty="0" err="1" smtClean="0"/>
+              <a:t>sID</a:t>
+            </a:r>
+            <a:r>
+              <a:rPr lang="en-US" dirty="0" smtClean="0"/>
+              <a:t>, name, </a:t>
+            </a:r>
+            <a:r>
+              <a:rPr lang="en-US" dirty="0" err="1" smtClean="0"/>
+              <a:t>courseID</a:t>
+            </a:r>
+            <a:r>
+              <a:rPr lang="en-US" dirty="0" smtClean="0"/>
+              <a:t>, title) </a:t>
+            </a:r>
+            <a:r>
+              <a:rPr lang="ru-RU" dirty="0" smtClean="0"/>
+              <a:t>с функциональными зависимостями</a:t>
+            </a:r>
+          </a:p>
+          <a:p>
+            <a:r>
+              <a:rPr lang="en-US" dirty="0" err="1" smtClean="0"/>
+              <a:t>sID</a:t>
+            </a:r>
+            <a:r>
+              <a:rPr lang="en-US" dirty="0"/>
+              <a:t> </a:t>
+            </a:r>
+            <a:r>
+              <a:rPr lang="en-US" dirty="0" smtClean="0"/>
+              <a:t>→ name</a:t>
+            </a:r>
+          </a:p>
+          <a:p>
+            <a:r>
+              <a:rPr lang="en-US" dirty="0" err="1" smtClean="0"/>
+              <a:t>courseID</a:t>
+            </a:r>
+            <a:r>
+              <a:rPr lang="en-US" dirty="0"/>
+              <a:t> </a:t>
+            </a:r>
+            <a:r>
+              <a:rPr lang="en-US" dirty="0" smtClean="0"/>
+              <a:t>→ title</a:t>
+            </a:r>
+          </a:p>
+          <a:p>
+            <a:pPr marL="0" indent="0">
+              <a:buNone/>
+            </a:pPr>
+            <a:endParaRPr lang="en-US" dirty="0" smtClean="0"/>
+          </a:p>
+          <a:p>
+            <a:pPr marL="0" indent="0">
+              <a:buNone/>
+            </a:pPr>
+            <a:r>
+              <a:rPr lang="ru-RU" dirty="0"/>
+              <a:t>Н</a:t>
+            </a:r>
+            <a:r>
+              <a:rPr lang="ru-RU" dirty="0" smtClean="0"/>
+              <a:t>аходится ли </a:t>
+            </a:r>
+            <a:r>
+              <a:rPr lang="en-US" dirty="0" smtClean="0"/>
+              <a:t>Took </a:t>
+            </a:r>
+            <a:r>
+              <a:rPr lang="ru-RU" dirty="0" smtClean="0"/>
+              <a:t>в Нормальной Форме Бойса-Кодда?</a:t>
+            </a:r>
+          </a:p>
+          <a:p>
+            <a:pPr marL="0" indent="0">
+              <a:buNone/>
+            </a:pPr>
+            <a:r>
+              <a:rPr lang="en-US" dirty="0" smtClean="0"/>
+              <a:t>BCNF </a:t>
+            </a:r>
+            <a:r>
+              <a:rPr lang="ru-RU" dirty="0" smtClean="0"/>
+              <a:t>требует, чтобы левая часть функциональной зависимости была ключем. Ни </a:t>
+            </a:r>
+            <a:r>
+              <a:rPr lang="en-US" dirty="0" err="1" smtClean="0"/>
+              <a:t>sID</a:t>
+            </a:r>
+            <a:r>
+              <a:rPr lang="en-US" dirty="0" smtClean="0"/>
+              <a:t>, </a:t>
+            </a:r>
+            <a:r>
+              <a:rPr lang="ru-RU" dirty="0" smtClean="0"/>
+              <a:t>ни </a:t>
+            </a:r>
+            <a:r>
+              <a:rPr lang="en-US" dirty="0" err="1" smtClean="0"/>
+              <a:t>courseID</a:t>
+            </a:r>
+            <a:r>
+              <a:rPr lang="en-US" dirty="0" smtClean="0"/>
+              <a:t> </a:t>
+            </a:r>
+            <a:r>
+              <a:rPr lang="ru-RU" dirty="0" smtClean="0"/>
+              <a:t>не являются ключем для </a:t>
+            </a:r>
+            <a:r>
+              <a:rPr lang="en-US" dirty="0" smtClean="0"/>
+              <a:t>Took.</a:t>
+            </a:r>
+            <a:endParaRPr lang="ru-RU" dirty="0" smtClean="0"/>
+          </a:p>
+        </p:txBody>
+      </p:sp>
+    </p:spTree>
+    <p:extLst>
+      <p:ext uri="{BB962C8B-B14F-4D97-AF65-F5344CB8AC3E}">
+        <p14:creationId xmlns:p14="http://schemas.microsoft.com/office/powerpoint/2010/main" val="1755433511"/>
+      </p:ext>
+    </p:extLst>
+  </p:cSld>
+  <p:clrMapOvr>
+    <a:masterClrMapping/>
+  </p:clrMapOvr>
+  <p:timing>
+    <p:tnLst>
+      <p:par>
+        <p:cTn id="1" dur="indefinite" restart="never" nodeType="tmRoot"/>
+      </p:par>
+    </p:tnLst>
+  </p:timing>
+</p:sld>
+</file>
+
+<file path=ppt/slides/slide22.xml><?xml version="1.0" encoding="utf-8"?>
+<p:sld xmlns:a="http://schemas.openxmlformats.org/drawingml/2006/main" xmlns:r="http://schemas.openxmlformats.org/officeDocument/2006/relationships" xmlns:p="http://schemas.openxmlformats.org/presentationml/2006/main">
+  <p:cSld>
+    <p:spTree>
+      <p:nvGrpSpPr>
+        <p:cNvPr id="1" name=""/>
+        <p:cNvGrpSpPr/>
+        <p:nvPr/>
+      </p:nvGrpSpPr>
+      <p:grpSpPr>
+        <a:xfrm>
+          <a:off x="0" y="0"/>
+          <a:ext cx="0" cy="0"/>
+          <a:chOff x="0" y="0"/>
+          <a:chExt cx="0" cy="0"/>
+        </a:xfrm>
+      </p:grpSpPr>
+      <p:sp>
+        <p:nvSpPr>
+          <p:cNvPr id="2" name="Title 1"/>
+          <p:cNvSpPr>
+            <a:spLocks noGrp="1"/>
+          </p:cNvSpPr>
+          <p:nvPr>
+            <p:ph type="title"/>
+          </p:nvPr>
+        </p:nvSpPr>
+        <p:spPr/>
+        <p:txBody>
+          <a:bodyPr/>
+          <a:lstStyle/>
+          <a:p>
+            <a:r>
+              <a:rPr lang="ru-RU" dirty="0" smtClean="0"/>
+              <a:t>Многозначные зависимости и</a:t>
+            </a:r>
+            <a:br>
+              <a:rPr lang="ru-RU" dirty="0" smtClean="0"/>
+            </a:br>
+            <a:r>
+              <a:rPr lang="ru-RU" dirty="0" smtClean="0"/>
+              <a:t>4-я нормальная форма</a:t>
+            </a:r>
+            <a:endParaRPr lang="en-US" dirty="0"/>
+          </a:p>
+        </p:txBody>
+      </p:sp>
+      <p:sp>
+        <p:nvSpPr>
+          <p:cNvPr id="3" name="Content Placeholder 2"/>
+          <p:cNvSpPr>
+            <a:spLocks noGrp="1"/>
+          </p:cNvSpPr>
+          <p:nvPr>
+            <p:ph idx="1"/>
+          </p:nvPr>
+        </p:nvSpPr>
+        <p:spPr/>
+        <p:txBody>
+          <a:bodyPr/>
+          <a:lstStyle/>
+          <a:p>
+            <a:pPr marL="0" indent="0">
+              <a:buNone/>
+            </a:pPr>
+            <a:r>
+              <a:rPr lang="en-US" dirty="0" smtClean="0"/>
+              <a:t>APPLY(</a:t>
+            </a:r>
+            <a:r>
+              <a:rPr lang="en-US" dirty="0" err="1" smtClean="0"/>
+              <a:t>passID</a:t>
+            </a:r>
+            <a:r>
+              <a:rPr lang="en-US" dirty="0" smtClean="0"/>
+              <a:t>, </a:t>
+            </a:r>
+            <a:r>
+              <a:rPr lang="en-US" dirty="0" err="1" smtClean="0"/>
+              <a:t>uName</a:t>
+            </a:r>
+            <a:r>
+              <a:rPr lang="en-US" dirty="0" smtClean="0"/>
+              <a:t>, HS)</a:t>
+            </a:r>
+          </a:p>
+          <a:p>
+            <a:r>
+              <a:rPr lang="ru-RU" dirty="0" smtClean="0"/>
+              <a:t>Избыточность; Аномалии удаления и обновления</a:t>
+            </a:r>
+            <a:r>
+              <a:rPr lang="en-US" dirty="0" smtClean="0"/>
+              <a:t>.</a:t>
+            </a:r>
+            <a:endParaRPr lang="ru-RU" dirty="0" smtClean="0"/>
+          </a:p>
+          <a:p>
+            <a:r>
+              <a:rPr lang="ru-RU" dirty="0" smtClean="0"/>
+              <a:t>Мультипликативный эффект: </a:t>
+            </a:r>
+            <a:r>
+              <a:rPr lang="en-US" dirty="0" smtClean="0"/>
+              <a:t>U </a:t>
+            </a:r>
+            <a:r>
+              <a:rPr lang="ru-RU" dirty="0" smtClean="0"/>
+              <a:t>университетов, </a:t>
+            </a:r>
+            <a:r>
+              <a:rPr lang="en-US" dirty="0" smtClean="0"/>
+              <a:t>H </a:t>
+            </a:r>
+            <a:r>
+              <a:rPr lang="ru-RU" dirty="0" smtClean="0"/>
+              <a:t>школ</a:t>
+            </a:r>
+            <a:r>
+              <a:rPr lang="en-US" dirty="0" smtClean="0"/>
+              <a:t>.</a:t>
+            </a:r>
+            <a:endParaRPr lang="ru-RU" dirty="0" smtClean="0"/>
+          </a:p>
+          <a:p>
+            <a:r>
+              <a:rPr lang="ru-RU" dirty="0" smtClean="0"/>
+              <a:t>Не может быть развязана с помощью </a:t>
+            </a:r>
+            <a:r>
+              <a:rPr lang="en-US" dirty="0" smtClean="0"/>
+              <a:t>BCNF: </a:t>
+            </a:r>
+            <a:r>
+              <a:rPr lang="ru-RU" dirty="0" smtClean="0"/>
+              <a:t>нет функциональных зависимостей.</a:t>
+            </a:r>
+            <a:r>
+              <a:rPr lang="en-US" dirty="0" smtClean="0"/>
+              <a:t> </a:t>
+            </a:r>
+            <a:r>
+              <a:rPr lang="en-US" dirty="0" err="1" smtClean="0"/>
+              <a:t>passID</a:t>
+            </a:r>
+            <a:r>
+              <a:rPr lang="en-US" dirty="0" smtClean="0"/>
+              <a:t> </a:t>
+            </a:r>
+            <a:r>
+              <a:rPr lang="ru-RU" dirty="0" smtClean="0"/>
+              <a:t>не связана с </a:t>
+            </a:r>
+            <a:r>
+              <a:rPr lang="en-US" dirty="0" err="1" smtClean="0"/>
+              <a:t>uName</a:t>
+            </a:r>
+            <a:r>
+              <a:rPr lang="en-US" dirty="0" smtClean="0"/>
+              <a:t>. </a:t>
+            </a:r>
+            <a:r>
+              <a:rPr lang="en-US" dirty="0" err="1" smtClean="0"/>
+              <a:t>passID</a:t>
+            </a:r>
+            <a:r>
+              <a:rPr lang="en-US" dirty="0" smtClean="0"/>
+              <a:t> </a:t>
+            </a:r>
+            <a:r>
+              <a:rPr lang="ru-RU" dirty="0" smtClean="0"/>
+              <a:t>не связан с </a:t>
+            </a:r>
+            <a:r>
+              <a:rPr lang="en-US" dirty="0" smtClean="0"/>
+              <a:t>HS.</a:t>
+            </a:r>
+          </a:p>
+          <a:p>
+            <a:endParaRPr lang="en-US" dirty="0" smtClean="0"/>
+          </a:p>
+          <a:p>
+            <a:pPr marL="0" indent="0">
+              <a:buNone/>
+            </a:pPr>
+            <a:r>
+              <a:rPr lang="ru-RU" dirty="0" smtClean="0"/>
+              <a:t>Многозначная зависимость </a:t>
+            </a:r>
+            <a:r>
+              <a:rPr lang="en-US" dirty="0" err="1" smtClean="0"/>
+              <a:t>passID</a:t>
+            </a:r>
+            <a:r>
+              <a:rPr lang="en-US" dirty="0" smtClean="0"/>
+              <a:t> </a:t>
+            </a:r>
+            <a:r>
+              <a:rPr lang="ru-RU" dirty="0" smtClean="0"/>
+              <a:t>-</a:t>
+            </a:r>
+            <a:r>
+              <a:rPr lang="en-US" dirty="0" smtClean="0"/>
+              <a:t>&gt;&gt; </a:t>
+            </a:r>
+            <a:r>
+              <a:rPr lang="en-US" dirty="0" err="1" smtClean="0"/>
+              <a:t>uName</a:t>
+            </a:r>
+            <a:r>
+              <a:rPr lang="en-US" dirty="0" smtClean="0"/>
+              <a:t>, </a:t>
+            </a:r>
+            <a:r>
+              <a:rPr lang="en-US" dirty="0" err="1" smtClean="0"/>
+              <a:t>passID</a:t>
+            </a:r>
+            <a:r>
+              <a:rPr lang="en-US" dirty="0" smtClean="0"/>
+              <a:t> -&gt;&gt; HS</a:t>
+            </a:r>
+          </a:p>
+          <a:p>
+            <a:r>
+              <a:rPr lang="ru-RU" dirty="0" smtClean="0"/>
+              <a:t>При заданном </a:t>
+            </a:r>
+            <a:r>
+              <a:rPr lang="en-US" dirty="0" err="1" smtClean="0"/>
+              <a:t>passID</a:t>
+            </a:r>
+            <a:r>
+              <a:rPr lang="en-US" dirty="0" smtClean="0"/>
+              <a:t> </a:t>
+            </a:r>
+            <a:r>
+              <a:rPr lang="ru-RU" dirty="0" smtClean="0"/>
+              <a:t>имеем каждую комбинацию </a:t>
+            </a:r>
+            <a:r>
+              <a:rPr lang="en-US" dirty="0" err="1" smtClean="0"/>
+              <a:t>uName</a:t>
+            </a:r>
+            <a:r>
+              <a:rPr lang="en-US" dirty="0" smtClean="0"/>
+              <a:t> </a:t>
+            </a:r>
+            <a:r>
+              <a:rPr lang="ru-RU" dirty="0" smtClean="0"/>
+              <a:t>с </a:t>
+            </a:r>
+            <a:r>
+              <a:rPr lang="en-US" dirty="0" smtClean="0"/>
+              <a:t>HS.</a:t>
+            </a:r>
+          </a:p>
+          <a:p>
+            <a:r>
+              <a:rPr lang="ru-RU" dirty="0" smtClean="0"/>
+              <a:t>Для одного </a:t>
+            </a:r>
+            <a:r>
+              <a:rPr lang="en-US" dirty="0" err="1" smtClean="0"/>
+              <a:t>passID</a:t>
+            </a:r>
+            <a:r>
+              <a:rPr lang="en-US" dirty="0" smtClean="0"/>
+              <a:t>, </a:t>
+            </a:r>
+            <a:r>
+              <a:rPr lang="ru-RU" dirty="0" smtClean="0"/>
+              <a:t>хранит каждое значение </a:t>
+            </a:r>
+            <a:r>
+              <a:rPr lang="en-US" dirty="0" err="1" smtClean="0"/>
+              <a:t>uName</a:t>
+            </a:r>
+            <a:r>
+              <a:rPr lang="en-US" dirty="0" smtClean="0"/>
+              <a:t> </a:t>
+            </a:r>
+            <a:r>
+              <a:rPr lang="ru-RU" dirty="0" smtClean="0"/>
+              <a:t>с каждым значением </a:t>
+            </a:r>
+            <a:r>
+              <a:rPr lang="en-US" dirty="0" smtClean="0"/>
+              <a:t>HS.</a:t>
+            </a:r>
+            <a:endParaRPr lang="en-US" dirty="0"/>
+          </a:p>
+        </p:txBody>
+      </p:sp>
+    </p:spTree>
+    <p:extLst>
+      <p:ext uri="{BB962C8B-B14F-4D97-AF65-F5344CB8AC3E}">
+        <p14:creationId xmlns:p14="http://schemas.microsoft.com/office/powerpoint/2010/main" val="2985565635"/>
+      </p:ext>
+    </p:extLst>
+  </p:cSld>
+  <p:clrMapOvr>
+    <a:masterClrMapping/>
+  </p:clrMapOvr>
+  <p:timing>
+    <p:tnLst>
+      <p:par>
+        <p:cTn id="1" dur="indefinite" restart="never" nodeType="tmRoot"/>
+      </p:par>
+    </p:tnLst>
+  </p:timing>
+</p:sld>
+</file>
+
+<file path=ppt/slides/slide23.xml><?xml version="1.0" encoding="utf-8"?>
+<p:sld xmlns:a="http://schemas.openxmlformats.org/drawingml/2006/main" xmlns:r="http://schemas.openxmlformats.org/officeDocument/2006/relationships" xmlns:p="http://schemas.openxmlformats.org/presentationml/2006/main">
+  <p:cSld>
+    <p:spTree>
+      <p:nvGrpSpPr>
+        <p:cNvPr id="1" name=""/>
+        <p:cNvGrpSpPr/>
+        <p:nvPr/>
+      </p:nvGrpSpPr>
+      <p:grpSpPr>
+        <a:xfrm>
+          <a:off x="0" y="0"/>
+          <a:ext cx="0" cy="0"/>
+          <a:chOff x="0" y="0"/>
+          <a:chExt cx="0" cy="0"/>
+        </a:xfrm>
+      </p:grpSpPr>
+      <p:sp>
+        <p:nvSpPr>
+          <p:cNvPr id="2" name="Title 1"/>
+          <p:cNvSpPr>
+            <a:spLocks noGrp="1"/>
+          </p:cNvSpPr>
+          <p:nvPr>
+            <p:ph type="title"/>
+          </p:nvPr>
+        </p:nvSpPr>
+        <p:spPr/>
+        <p:txBody>
+          <a:bodyPr/>
+          <a:lstStyle/>
+          <a:p>
+            <a:r>
+              <a:rPr lang="ru-RU" dirty="0" smtClean="0"/>
+              <a:t>Многозначные зависимости и</a:t>
+            </a:r>
+            <a:br>
+              <a:rPr lang="ru-RU" dirty="0" smtClean="0"/>
+            </a:br>
+            <a:r>
+              <a:rPr lang="ru-RU" dirty="0" smtClean="0"/>
+              <a:t>4-я нормальная форма</a:t>
+            </a:r>
+            <a:endParaRPr lang="en-US" dirty="0"/>
+          </a:p>
+        </p:txBody>
+      </p:sp>
+      <p:sp>
+        <p:nvSpPr>
+          <p:cNvPr id="3" name="Content Placeholder 2"/>
+          <p:cNvSpPr>
+            <a:spLocks noGrp="1"/>
+          </p:cNvSpPr>
+          <p:nvPr>
+            <p:ph idx="1"/>
+          </p:nvPr>
+        </p:nvSpPr>
+        <p:spPr>
+          <a:xfrm>
+            <a:off x="818348" y="2060898"/>
+            <a:ext cx="7511472" cy="4797102"/>
+          </a:xfrm>
+        </p:spPr>
+        <p:txBody>
+          <a:bodyPr>
+            <a:normAutofit/>
+          </a:bodyPr>
+          <a:lstStyle/>
+          <a:p>
+            <a:pPr marL="0" indent="0">
+              <a:buNone/>
+            </a:pPr>
+            <a:r>
+              <a:rPr lang="ru-RU" dirty="0" smtClean="0"/>
+              <a:t>Четвертая нормальная форма: Если </a:t>
+            </a:r>
+            <a:r>
+              <a:rPr lang="en-US" dirty="0" smtClean="0"/>
+              <a:t>A -&gt;&gt; B, </a:t>
+            </a:r>
+            <a:r>
+              <a:rPr lang="ru-RU" dirty="0" smtClean="0"/>
+              <a:t>то А</a:t>
+            </a:r>
+            <a:r>
+              <a:rPr lang="en-US" dirty="0" smtClean="0"/>
+              <a:t> – </a:t>
+            </a:r>
+            <a:r>
+              <a:rPr lang="ru-RU" dirty="0" smtClean="0"/>
+              <a:t>ключ.</a:t>
+            </a:r>
+          </a:p>
+          <a:p>
+            <a:pPr marL="0" indent="0">
+              <a:buNone/>
+            </a:pPr>
+            <a:r>
+              <a:rPr lang="ru-RU" dirty="0" smtClean="0"/>
+              <a:t>Декомпозиция: </a:t>
+            </a:r>
+            <a:r>
+              <a:rPr lang="en-US" dirty="0" smtClean="0"/>
+              <a:t>Apply(</a:t>
+            </a:r>
+            <a:r>
+              <a:rPr lang="en-US" dirty="0" err="1" smtClean="0"/>
+              <a:t>passID</a:t>
+            </a:r>
+            <a:r>
+              <a:rPr lang="en-US" dirty="0" smtClean="0"/>
+              <a:t>, </a:t>
+            </a:r>
+            <a:r>
+              <a:rPr lang="en-US" dirty="0" err="1" smtClean="0"/>
+              <a:t>uName</a:t>
+            </a:r>
+            <a:r>
+              <a:rPr lang="en-US" dirty="0" smtClean="0"/>
+              <a:t>), </a:t>
+            </a:r>
+            <a:r>
+              <a:rPr lang="en-US" dirty="0" err="1" smtClean="0"/>
+              <a:t>HighSchool</a:t>
+            </a:r>
+            <a:r>
+              <a:rPr lang="en-US" dirty="0" smtClean="0"/>
+              <a:t>(</a:t>
+            </a:r>
+            <a:r>
+              <a:rPr lang="en-US" dirty="0" err="1" smtClean="0"/>
+              <a:t>passID</a:t>
+            </a:r>
+            <a:r>
+              <a:rPr lang="en-US" dirty="0" smtClean="0"/>
+              <a:t>, HS)</a:t>
+            </a:r>
+          </a:p>
+          <a:p>
+            <a:pPr marL="0" indent="0">
+              <a:buNone/>
+            </a:pPr>
+            <a:endParaRPr lang="en-US" dirty="0"/>
+          </a:p>
+          <a:p>
+            <a:pPr marL="0" indent="0">
+              <a:buNone/>
+            </a:pPr>
+            <a:r>
+              <a:rPr lang="ru-RU" dirty="0" smtClean="0"/>
+              <a:t>Вместо </a:t>
+            </a:r>
+            <a:r>
+              <a:rPr lang="en-US" dirty="0"/>
+              <a:t>U</a:t>
+            </a:r>
+            <a:r>
+              <a:rPr lang="en-US" dirty="0" smtClean="0"/>
+              <a:t> * H </a:t>
+            </a:r>
+            <a:r>
+              <a:rPr lang="ru-RU" dirty="0" smtClean="0"/>
+              <a:t>имеем </a:t>
+            </a:r>
+            <a:r>
+              <a:rPr lang="en-US" dirty="0"/>
+              <a:t>U</a:t>
+            </a:r>
+            <a:r>
+              <a:rPr lang="en-US" dirty="0" smtClean="0"/>
+              <a:t> + H.</a:t>
+            </a:r>
+            <a:endParaRPr lang="en-US" dirty="0"/>
+          </a:p>
+        </p:txBody>
+      </p:sp>
+    </p:spTree>
+    <p:extLst>
+      <p:ext uri="{BB962C8B-B14F-4D97-AF65-F5344CB8AC3E}">
+        <p14:creationId xmlns:p14="http://schemas.microsoft.com/office/powerpoint/2010/main" val="3634395971"/>
+      </p:ext>
+    </p:extLst>
+  </p:cSld>
+  <p:clrMapOvr>
+    <a:masterClrMapping/>
+  </p:clrMapOvr>
+  <p:timing>
+    <p:tnLst>
+      <p:par>
+        <p:cTn id="1" dur="indefinite" restart="never" nodeType="tmRoot"/>
+      </p:par>
+    </p:tnLst>
+  </p:timing>
+</p:sld>
+</file>
+
+<file path=ppt/slides/slide24.xml><?xml version="1.0" encoding="utf-8"?>
+<p:sld xmlns:a="http://schemas.openxmlformats.org/drawingml/2006/main" xmlns:r="http://schemas.openxmlformats.org/officeDocument/2006/relationships" xmlns:p="http://schemas.openxmlformats.org/presentationml/2006/main">
+  <p:cSld>
+    <p:spTree>
+      <p:nvGrpSpPr>
+        <p:cNvPr id="1" name=""/>
+        <p:cNvGrpSpPr/>
+        <p:nvPr/>
+      </p:nvGrpSpPr>
+      <p:grpSpPr>
+        <a:xfrm>
+          <a:off x="0" y="0"/>
+          <a:ext cx="0" cy="0"/>
+          <a:chOff x="0" y="0"/>
+          <a:chExt cx="0" cy="0"/>
+        </a:xfrm>
+      </p:grpSpPr>
+      <p:sp>
+        <p:nvSpPr>
+          <p:cNvPr id="2" name="Title 1"/>
+          <p:cNvSpPr>
+            <a:spLocks noGrp="1"/>
+          </p:cNvSpPr>
+          <p:nvPr>
+            <p:ph type="title"/>
+          </p:nvPr>
+        </p:nvSpPr>
+        <p:spPr/>
+        <p:txBody>
+          <a:bodyPr/>
+          <a:lstStyle/>
+          <a:p>
+            <a:r>
+              <a:rPr lang="ru-RU" dirty="0" smtClean="0"/>
+              <a:t>Вопрос</a:t>
+            </a:r>
+            <a:endParaRPr lang="en-US" dirty="0"/>
+          </a:p>
+        </p:txBody>
+      </p:sp>
+      <p:sp>
+        <p:nvSpPr>
+          <p:cNvPr id="3" name="Content Placeholder 2"/>
+          <p:cNvSpPr>
+            <a:spLocks noGrp="1"/>
+          </p:cNvSpPr>
+          <p:nvPr>
+            <p:ph idx="1"/>
+          </p:nvPr>
+        </p:nvSpPr>
+        <p:spPr>
+          <a:xfrm>
+            <a:off x="818348" y="2060898"/>
+            <a:ext cx="7511472" cy="4203978"/>
+          </a:xfrm>
+        </p:spPr>
+        <p:txBody>
+          <a:bodyPr/>
+          <a:lstStyle/>
+          <a:p>
+            <a:pPr marL="0" indent="0">
+              <a:buNone/>
+            </a:pPr>
+            <a:r>
+              <a:rPr lang="ru-RU" dirty="0" smtClean="0"/>
+              <a:t>Представьте отношение </a:t>
+            </a:r>
+            <a:r>
+              <a:rPr lang="en-US" dirty="0" err="1" smtClean="0"/>
+              <a:t>StudentInfo</a:t>
+            </a:r>
+            <a:r>
+              <a:rPr lang="en-US" dirty="0" smtClean="0"/>
+              <a:t>(</a:t>
+            </a:r>
+            <a:r>
+              <a:rPr lang="en-US" dirty="0" err="1" smtClean="0"/>
+              <a:t>sID</a:t>
+            </a:r>
+            <a:r>
+              <a:rPr lang="en-US" dirty="0" smtClean="0"/>
+              <a:t>, dorm, </a:t>
+            </a:r>
+            <a:r>
+              <a:rPr lang="en-US" dirty="0" err="1" smtClean="0"/>
+              <a:t>courseID</a:t>
+            </a:r>
+            <a:r>
+              <a:rPr lang="en-US" dirty="0" smtClean="0"/>
+              <a:t>). </a:t>
+            </a:r>
+            <a:r>
+              <a:rPr lang="ru-RU" dirty="0" smtClean="0"/>
+              <a:t>Студенты обычно живут в разных общежитиях и посещают множество курсов в течение обучения в университете. Предположим, что данные не отражают, в каком общежитии проживал студент, пока посещал какой-то определенный курс, т.е. существуют всевозможные комбинации каждого курса и общежития, в котором проживал студент. Какая из многозначных зависимостей описывает отношение </a:t>
+            </a:r>
+            <a:r>
+              <a:rPr lang="en-US" dirty="0" err="1" smtClean="0"/>
+              <a:t>StudentInfo</a:t>
+            </a:r>
+            <a:r>
+              <a:rPr lang="en-US" dirty="0" smtClean="0"/>
+              <a:t>?</a:t>
+            </a:r>
+          </a:p>
+          <a:p>
+            <a:r>
+              <a:rPr lang="en-US" dirty="0" err="1" smtClean="0"/>
+              <a:t>sID</a:t>
+            </a:r>
+            <a:r>
+              <a:rPr lang="en-US" dirty="0" smtClean="0"/>
+              <a:t> -&gt;&gt; dorm</a:t>
+            </a:r>
+          </a:p>
+          <a:p>
+            <a:r>
+              <a:rPr lang="en-US" dirty="0" err="1" smtClean="0"/>
+              <a:t>sID</a:t>
+            </a:r>
+            <a:r>
+              <a:rPr lang="en-US" dirty="0" smtClean="0"/>
+              <a:t> -&gt;&gt; </a:t>
+            </a:r>
+            <a:r>
+              <a:rPr lang="en-US" dirty="0" err="1" smtClean="0"/>
+              <a:t>courseID</a:t>
+            </a:r>
+            <a:endParaRPr lang="en-US" dirty="0" smtClean="0"/>
+          </a:p>
+          <a:p>
+            <a:r>
+              <a:rPr lang="en-US" dirty="0" err="1" smtClean="0"/>
+              <a:t>sID</a:t>
+            </a:r>
+            <a:r>
+              <a:rPr lang="en-US" dirty="0" smtClean="0"/>
+              <a:t> -&gt;&gt; dorm, </a:t>
+            </a:r>
+            <a:r>
+              <a:rPr lang="en-US" dirty="0" err="1" smtClean="0"/>
+              <a:t>sID</a:t>
+            </a:r>
+            <a:r>
+              <a:rPr lang="en-US" dirty="0" smtClean="0"/>
+              <a:t> -&gt;&gt; </a:t>
+            </a:r>
+            <a:r>
+              <a:rPr lang="en-US" dirty="0" err="1" smtClean="0"/>
+              <a:t>courseID</a:t>
+            </a:r>
+            <a:endParaRPr lang="en-US" dirty="0" smtClean="0"/>
+          </a:p>
+          <a:p>
+            <a:r>
+              <a:rPr lang="en-US" dirty="0" err="1" smtClean="0"/>
+              <a:t>sID</a:t>
+            </a:r>
+            <a:r>
+              <a:rPr lang="en-US" dirty="0" smtClean="0"/>
+              <a:t> -&gt;&gt; dorm, </a:t>
+            </a:r>
+            <a:r>
+              <a:rPr lang="en-US" dirty="0" err="1" smtClean="0"/>
+              <a:t>sID</a:t>
+            </a:r>
+            <a:r>
+              <a:rPr lang="en-US" dirty="0" smtClean="0"/>
+              <a:t> -&gt;&gt; </a:t>
+            </a:r>
+            <a:r>
+              <a:rPr lang="en-US" dirty="0" err="1" smtClean="0"/>
+              <a:t>courseID</a:t>
+            </a:r>
+            <a:r>
+              <a:rPr lang="en-US" dirty="0" smtClean="0"/>
+              <a:t>, dorm -&gt;&gt; </a:t>
+            </a:r>
+            <a:r>
+              <a:rPr lang="en-US" dirty="0" err="1" smtClean="0"/>
+              <a:t>courseID</a:t>
+            </a:r>
+            <a:endParaRPr lang="en-US" dirty="0"/>
+          </a:p>
+        </p:txBody>
+      </p:sp>
+    </p:spTree>
+    <p:extLst>
+      <p:ext uri="{BB962C8B-B14F-4D97-AF65-F5344CB8AC3E}">
+        <p14:creationId xmlns:p14="http://schemas.microsoft.com/office/powerpoint/2010/main" val="818650558"/>
+      </p:ext>
+    </p:extLst>
+  </p:cSld>
+  <p:clrMapOvr>
+    <a:masterClrMapping/>
+  </p:clrMapOvr>
+  <p:timing>
+    <p:tnLst>
+      <p:par>
+        <p:cTn id="1" dur="indefinite" restart="never" nodeType="tmRoot"/>
+      </p:par>
+    </p:tnLst>
+  </p:timing>
+</p:sld>
+</file>
+
+<file path=ppt/slides/slide25.xml><?xml version="1.0" encoding="utf-8"?>
+<p:sld xmlns:a="http://schemas.openxmlformats.org/drawingml/2006/main" xmlns:r="http://schemas.openxmlformats.org/officeDocument/2006/relationships" xmlns:p="http://schemas.openxmlformats.org/presentationml/2006/main">
+  <p:cSld>
+    <p:spTree>
+      <p:nvGrpSpPr>
+        <p:cNvPr id="1" name=""/>
+        <p:cNvGrpSpPr/>
+        <p:nvPr/>
+      </p:nvGrpSpPr>
+      <p:grpSpPr>
+        <a:xfrm>
+          <a:off x="0" y="0"/>
+          <a:ext cx="0" cy="0"/>
+          <a:chOff x="0" y="0"/>
+          <a:chExt cx="0" cy="0"/>
+        </a:xfrm>
+      </p:grpSpPr>
+      <p:sp>
+        <p:nvSpPr>
+          <p:cNvPr id="2" name="Title 1"/>
+          <p:cNvSpPr>
+            <a:spLocks noGrp="1"/>
+          </p:cNvSpPr>
+          <p:nvPr>
+            <p:ph type="title"/>
+          </p:nvPr>
+        </p:nvSpPr>
+        <p:spPr/>
+        <p:txBody>
+          <a:bodyPr/>
+          <a:lstStyle/>
+          <a:p>
+            <a:r>
+              <a:rPr lang="ru-RU" dirty="0" smtClean="0"/>
+              <a:t>Вопрос</a:t>
+            </a:r>
+            <a:endParaRPr lang="en-US" dirty="0"/>
+          </a:p>
+        </p:txBody>
+      </p:sp>
+      <p:sp>
+        <p:nvSpPr>
+          <p:cNvPr id="3" name="Content Placeholder 2"/>
+          <p:cNvSpPr>
+            <a:spLocks noGrp="1"/>
+          </p:cNvSpPr>
+          <p:nvPr>
+            <p:ph idx="1"/>
+          </p:nvPr>
+        </p:nvSpPr>
+        <p:spPr/>
+        <p:txBody>
+          <a:bodyPr/>
+          <a:lstStyle/>
+          <a:p>
+            <a:pPr marL="0" indent="0">
+              <a:buNone/>
+            </a:pPr>
+            <a:r>
+              <a:rPr lang="ru-RU" dirty="0" smtClean="0"/>
+              <a:t>Рассмотрим отношение </a:t>
+            </a:r>
+            <a:r>
+              <a:rPr lang="en-US" dirty="0" err="1" smtClean="0"/>
+              <a:t>StudentInfo</a:t>
+            </a:r>
+            <a:r>
+              <a:rPr lang="en-US" dirty="0" smtClean="0"/>
+              <a:t>(</a:t>
+            </a:r>
+            <a:r>
+              <a:rPr lang="en-US" dirty="0" err="1" smtClean="0"/>
+              <a:t>sID</a:t>
+            </a:r>
+            <a:r>
+              <a:rPr lang="en-US" dirty="0" smtClean="0"/>
+              <a:t>, dorm, </a:t>
+            </a:r>
+            <a:r>
+              <a:rPr lang="en-US" dirty="0" err="1" smtClean="0"/>
+              <a:t>courseID</a:t>
+            </a:r>
+            <a:r>
+              <a:rPr lang="en-US" dirty="0" smtClean="0"/>
+              <a:t>) </a:t>
+            </a:r>
+            <a:r>
+              <a:rPr lang="ru-RU" dirty="0" smtClean="0"/>
+              <a:t>с многозначными зависимостями:</a:t>
+            </a:r>
+          </a:p>
+          <a:p>
+            <a:pPr>
+              <a:buFont typeface="Arial" panose="020B0604020202020204" pitchFamily="34" charset="0"/>
+              <a:buChar char="•"/>
+            </a:pPr>
+            <a:r>
+              <a:rPr lang="en-US" dirty="0" err="1" smtClean="0"/>
+              <a:t>sID</a:t>
+            </a:r>
+            <a:r>
+              <a:rPr lang="en-US" dirty="0" smtClean="0"/>
+              <a:t> -&gt;&gt; dorm</a:t>
+            </a:r>
+          </a:p>
+          <a:p>
+            <a:pPr>
+              <a:buFont typeface="Arial" panose="020B0604020202020204" pitchFamily="34" charset="0"/>
+              <a:buChar char="•"/>
+            </a:pPr>
+            <a:r>
+              <a:rPr lang="en-US" dirty="0" err="1" smtClean="0"/>
+              <a:t>sID</a:t>
+            </a:r>
+            <a:r>
+              <a:rPr lang="en-US" dirty="0"/>
+              <a:t> </a:t>
+            </a:r>
+            <a:r>
+              <a:rPr lang="en-US" dirty="0" smtClean="0"/>
+              <a:t>-&gt;&gt; </a:t>
+            </a:r>
+            <a:r>
+              <a:rPr lang="en-US" dirty="0" err="1" smtClean="0"/>
+              <a:t>courseID</a:t>
+            </a:r>
+            <a:endParaRPr lang="ru-RU" dirty="0" smtClean="0"/>
+          </a:p>
+          <a:p>
+            <a:pPr marL="0" indent="0">
+              <a:buNone/>
+            </a:pPr>
+            <a:endParaRPr lang="en-US" dirty="0" smtClean="0"/>
+          </a:p>
+          <a:p>
+            <a:pPr marL="0" indent="0">
+              <a:buNone/>
+            </a:pPr>
+            <a:r>
+              <a:rPr lang="ru-RU" dirty="0" smtClean="0"/>
+              <a:t>Находится ли </a:t>
+            </a:r>
+            <a:r>
+              <a:rPr lang="en-US" dirty="0" err="1" smtClean="0"/>
+              <a:t>StudentInfo</a:t>
+            </a:r>
+            <a:r>
+              <a:rPr lang="en-US" dirty="0" smtClean="0"/>
+              <a:t> </a:t>
+            </a:r>
+            <a:r>
+              <a:rPr lang="ru-RU" dirty="0" smtClean="0"/>
+              <a:t>в 4-й нормальной форме?</a:t>
+            </a:r>
+            <a:endParaRPr lang="en-US" dirty="0" smtClean="0"/>
+          </a:p>
+          <a:p>
+            <a:pPr marL="0" indent="0">
+              <a:buNone/>
+            </a:pPr>
+            <a:endParaRPr lang="en-US" dirty="0"/>
+          </a:p>
+        </p:txBody>
+      </p:sp>
+    </p:spTree>
+    <p:extLst>
+      <p:ext uri="{BB962C8B-B14F-4D97-AF65-F5344CB8AC3E}">
+        <p14:creationId xmlns:p14="http://schemas.microsoft.com/office/powerpoint/2010/main" val="3206394535"/>
+      </p:ext>
+    </p:extLst>
+  </p:cSld>
+  <p:clrMapOvr>
+    <a:masterClrMapping/>
+  </p:clrMapOvr>
+  <p:timing>
+    <p:tnLst>
+      <p:par>
+        <p:cTn id="1" dur="indefinite" restart="never" nodeType="tmRoot"/>
+      </p:par>
+    </p:tnLst>
+  </p:timing>
+</p:sld>
+</file>
+
+<file path=ppt/slides/slide26.xml><?xml version="1.0" encoding="utf-8"?>
+<p:sld xmlns:a="http://schemas.openxmlformats.org/drawingml/2006/main" xmlns:r="http://schemas.openxmlformats.org/officeDocument/2006/relationships" xmlns:p="http://schemas.openxmlformats.org/presentationml/2006/main">
+  <p:cSld>
+    <p:spTree>
+      <p:nvGrpSpPr>
+        <p:cNvPr id="1" name=""/>
+        <p:cNvGrpSpPr/>
+        <p:nvPr/>
+      </p:nvGrpSpPr>
+      <p:grpSpPr>
+        <a:xfrm>
+          <a:off x="0" y="0"/>
+          <a:ext cx="0" cy="0"/>
+          <a:chOff x="0" y="0"/>
+          <a:chExt cx="0" cy="0"/>
+        </a:xfrm>
+      </p:grpSpPr>
+      <p:sp>
+        <p:nvSpPr>
+          <p:cNvPr id="2" name="Title 1"/>
+          <p:cNvSpPr>
+            <a:spLocks noGrp="1"/>
+          </p:cNvSpPr>
+          <p:nvPr>
+            <p:ph type="title"/>
+          </p:nvPr>
+        </p:nvSpPr>
+        <p:spPr/>
+        <p:txBody>
+          <a:bodyPr/>
+          <a:lstStyle/>
+          <a:p>
+            <a:r>
+              <a:rPr lang="ru-RU" dirty="0" smtClean="0"/>
+              <a:t>Вопрос</a:t>
+            </a:r>
+            <a:endParaRPr lang="en-US" dirty="0"/>
+          </a:p>
+        </p:txBody>
+      </p:sp>
+      <p:sp>
+        <p:nvSpPr>
+          <p:cNvPr id="3" name="Content Placeholder 2"/>
+          <p:cNvSpPr>
+            <a:spLocks noGrp="1"/>
+          </p:cNvSpPr>
+          <p:nvPr>
+            <p:ph idx="1"/>
+          </p:nvPr>
+        </p:nvSpPr>
+        <p:spPr/>
+        <p:txBody>
+          <a:bodyPr/>
+          <a:lstStyle/>
+          <a:p>
+            <a:pPr marL="0" indent="0">
+              <a:buNone/>
+            </a:pPr>
+            <a:r>
+              <a:rPr lang="ru-RU" dirty="0" smtClean="0"/>
+              <a:t>Рассмотрим отношение </a:t>
+            </a:r>
+            <a:r>
+              <a:rPr lang="en-US" dirty="0" err="1" smtClean="0"/>
+              <a:t>StudentInfo</a:t>
+            </a:r>
+            <a:r>
+              <a:rPr lang="en-US" dirty="0" smtClean="0"/>
+              <a:t>(</a:t>
+            </a:r>
+            <a:r>
+              <a:rPr lang="en-US" dirty="0" err="1" smtClean="0"/>
+              <a:t>sID</a:t>
+            </a:r>
+            <a:r>
+              <a:rPr lang="en-US" dirty="0" smtClean="0"/>
+              <a:t>, dorm, </a:t>
+            </a:r>
+            <a:r>
+              <a:rPr lang="en-US" dirty="0" err="1" smtClean="0"/>
+              <a:t>courseID</a:t>
+            </a:r>
+            <a:r>
+              <a:rPr lang="en-US" dirty="0" smtClean="0"/>
+              <a:t>) </a:t>
+            </a:r>
+            <a:r>
+              <a:rPr lang="ru-RU" dirty="0" smtClean="0"/>
+              <a:t>с многозначными зависимостями:</a:t>
+            </a:r>
+          </a:p>
+          <a:p>
+            <a:pPr>
+              <a:buFont typeface="Arial" panose="020B0604020202020204" pitchFamily="34" charset="0"/>
+              <a:buChar char="•"/>
+            </a:pPr>
+            <a:r>
+              <a:rPr lang="en-US" dirty="0" err="1" smtClean="0"/>
+              <a:t>sID</a:t>
+            </a:r>
+            <a:r>
+              <a:rPr lang="en-US" dirty="0" smtClean="0"/>
+              <a:t> -&gt;&gt; dorm</a:t>
+            </a:r>
+          </a:p>
+          <a:p>
+            <a:pPr>
+              <a:buFont typeface="Arial" panose="020B0604020202020204" pitchFamily="34" charset="0"/>
+              <a:buChar char="•"/>
+            </a:pPr>
+            <a:r>
+              <a:rPr lang="en-US" dirty="0" err="1" smtClean="0"/>
+              <a:t>sID</a:t>
+            </a:r>
+            <a:r>
+              <a:rPr lang="en-US" dirty="0"/>
+              <a:t> </a:t>
+            </a:r>
+            <a:r>
+              <a:rPr lang="en-US" dirty="0" smtClean="0"/>
+              <a:t>-&gt;&gt; </a:t>
+            </a:r>
+            <a:r>
+              <a:rPr lang="en-US" dirty="0" err="1" smtClean="0"/>
+              <a:t>courseID</a:t>
+            </a:r>
+            <a:endParaRPr lang="ru-RU" dirty="0" smtClean="0"/>
+          </a:p>
+          <a:p>
+            <a:pPr marL="0" indent="0">
+              <a:buNone/>
+            </a:pPr>
+            <a:endParaRPr lang="en-US" dirty="0" smtClean="0"/>
+          </a:p>
+          <a:p>
+            <a:pPr marL="0" indent="0">
+              <a:buNone/>
+            </a:pPr>
+            <a:r>
+              <a:rPr lang="ru-RU" dirty="0" smtClean="0"/>
+              <a:t>Находится ли </a:t>
+            </a:r>
+            <a:r>
+              <a:rPr lang="en-US" dirty="0" err="1" smtClean="0"/>
+              <a:t>StudentInfo</a:t>
+            </a:r>
+            <a:r>
+              <a:rPr lang="en-US" dirty="0" smtClean="0"/>
+              <a:t> </a:t>
+            </a:r>
+            <a:r>
+              <a:rPr lang="ru-RU" dirty="0" smtClean="0"/>
+              <a:t>в 4-й нормальной форме?</a:t>
+            </a:r>
+            <a:endParaRPr lang="en-US" dirty="0" smtClean="0"/>
+          </a:p>
+          <a:p>
+            <a:pPr marL="0" indent="0">
+              <a:buNone/>
+            </a:pPr>
+            <a:r>
+              <a:rPr lang="ru-RU" dirty="0" smtClean="0"/>
+              <a:t>Нет, так как </a:t>
+            </a:r>
+            <a:r>
+              <a:rPr lang="en-US" dirty="0" err="1" smtClean="0"/>
+              <a:t>sID</a:t>
+            </a:r>
+            <a:r>
+              <a:rPr lang="en-US" dirty="0" smtClean="0"/>
+              <a:t> </a:t>
+            </a:r>
+            <a:r>
+              <a:rPr lang="ru-RU" dirty="0" smtClean="0"/>
+              <a:t>не является ключом для </a:t>
+            </a:r>
+            <a:r>
+              <a:rPr lang="en-US" dirty="0" err="1" smtClean="0"/>
+              <a:t>StudentInfo</a:t>
+            </a:r>
+            <a:r>
+              <a:rPr lang="en-US" smtClean="0"/>
+              <a:t>.</a:t>
+            </a:r>
+            <a:endParaRPr lang="en-US" dirty="0"/>
+          </a:p>
+        </p:txBody>
+      </p:sp>
+    </p:spTree>
+    <p:extLst>
+      <p:ext uri="{BB962C8B-B14F-4D97-AF65-F5344CB8AC3E}">
+        <p14:creationId xmlns:p14="http://schemas.microsoft.com/office/powerpoint/2010/main" val="3122335672"/>
+      </p:ext>
+    </p:extLst>
+  </p:cSld>
+  <p:clrMapOvr>
+    <a:masterClrMapping/>
+  </p:clrMapOvr>
+  <p:timing>
+    <p:tnLst>
+      <p:par>
+        <p:cTn id="1" dur="indefinite" restart="never" nodeType="tmRoot"/>
+      </p:par>
+    </p:tnLst>
+  </p:timing>
 </p:sld>
 </file>
 
@@ -7508,12 +10864,12 @@
         <p:spPr>
           <a:xfrm>
             <a:off x="818348" y="2060897"/>
-            <a:ext cx="7511472" cy="4488183"/>
+            <a:ext cx="7511472" cy="4599395"/>
           </a:xfrm>
         </p:spPr>
         <p:txBody>
           <a:bodyPr>
-            <a:normAutofit/>
+            <a:normAutofit lnSpcReduction="10000"/>
           </a:bodyPr>
           <a:lstStyle/>
           <a:p>
@@ -7600,8 +10956,16 @@
               <a:t>TPU, MSU, </a:t>
             </a:r>
             <a:r>
+              <a:rPr lang="en-US" sz="2400" dirty="0" smtClean="0"/>
+              <a:t>NSU, </a:t>
+            </a:r>
+            <a:r>
               <a:rPr lang="ru-RU" sz="2400" dirty="0" smtClean="0"/>
-              <a:t>играет в </a:t>
+              <a:t>играет </a:t>
+            </a:r>
+            <a:r>
+              <a:rPr lang="ru-RU" sz="2400" dirty="0" smtClean="0"/>
+              <a:t>в </a:t>
             </a:r>
             <a:r>
               <a:rPr lang="en-US" sz="2400" dirty="0" smtClean="0"/>
@@ -7675,11 +11039,28 @@
             </a:r>
             <a:r>
               <a:rPr lang="en-US" sz="2400" dirty="0"/>
-              <a:t> Tomsk G</a:t>
+              <a:t> Tomsk </a:t>
             </a:r>
             <a:r>
               <a:rPr lang="en-US" sz="2400" dirty="0" smtClean="0"/>
-              <a:t>uitar</a:t>
+              <a:t>Guitar</a:t>
+            </a:r>
+          </a:p>
+          <a:p>
+            <a:pPr marL="0" indent="0">
+              <a:buNone/>
+            </a:pPr>
+            <a:r>
+              <a:rPr lang="en-US" sz="2400" dirty="0" smtClean="0"/>
+              <a:t>…                           </a:t>
+            </a:r>
+            <a:r>
+              <a:rPr lang="en-US" sz="2400" dirty="0" err="1" smtClean="0"/>
+              <a:t>SpecialHS</a:t>
+            </a:r>
+            <a:r>
+              <a:rPr lang="en-US" sz="2400" dirty="0" smtClean="0"/>
+              <a:t> …</a:t>
             </a:r>
             <a:endParaRPr lang="en-US" sz="2400" dirty="0"/>
           </a:p>
@@ -7866,6 +11247,16 @@
             <a:pPr marL="0" indent="0">
               <a:buNone/>
             </a:pPr>
+            <a:endParaRPr lang="ru-RU" sz="2400" dirty="0" smtClean="0"/>
+          </a:p>
+          <a:p>
+            <a:pPr marL="0" indent="0">
+              <a:buNone/>
+            </a:pPr>
+            <a:r>
+              <a:rPr lang="ru-RU" sz="2400" dirty="0" smtClean="0"/>
+              <a:t>Сколько записей?</a:t>
+            </a:r>
             <a:endParaRPr lang="en-US" sz="2400" dirty="0"/>
           </a:p>
           <a:p>
@@ -7874,14 +11265,12 @@
             </a:pPr>
             <a:r>
               <a:rPr lang="ru-RU" sz="2400" dirty="0" smtClean="0"/>
-              <a:t>Недостатки дизайна?</a:t>
-            </a:r>
-            <a:endParaRPr lang="en-US" sz="2400" dirty="0"/>
-          </a:p>
-          <a:p>
-            <a:pPr marL="0" indent="0">
-              <a:buNone/>
-            </a:pPr>
+              <a:t>Недостатки дизайна</a:t>
+            </a:r>
+            <a:r>
+              <a:rPr lang="ru-RU" sz="2400" dirty="0" smtClean="0"/>
+              <a:t>?</a:t>
+            </a:r>
             <a:endParaRPr lang="en-US" sz="2400" dirty="0"/>
           </a:p>
         </p:txBody>
@@ -7996,8 +11385,9 @@
             </a:pPr>
             <a:r>
               <a:rPr lang="ru-RU" sz="2200" dirty="0" smtClean="0"/>
-              <a:t>Сложность удаления</a:t>
-            </a:r>
+              <a:t>Удаление (Когда студент имеет одно хобби, например, шахматы, то при удалении записей с этим хобби, мы полностью удалим запись о студенте).</a:t>
+            </a:r>
+            <a:endParaRPr lang="ru-RU" sz="2200" dirty="0" smtClean="0"/>
           </a:p>
         </p:txBody>
       </p:sp>
@@ -8477,4 +11867,265 @@
     </a:ext>
   </a:extLst>
 </a:theme>
+</file>
+
+<file path=ppt/theme/theme2.xml><?xml version="1.0" encoding="utf-8"?>
+<a:theme xmlns:a="http://schemas.openxmlformats.org/drawingml/2006/main" name="Office Theme">
+  <a:themeElements>
+    <a:clrScheme name="Office">
+      <a:dk1>
+        <a:sysClr val="windowText" lastClr="000000"/>
+      </a:dk1>
+      <a:lt1>
+        <a:sysClr val="window" lastClr="FFFFFF"/>
+      </a:lt1>
+      <a:dk2>
+        <a:srgbClr val="44546A"/>
+      </a:dk2>
+      <a:lt2>
+        <a:srgbClr val="E7E6E6"/>
+      </a:lt2>
+      <a:accent1>
+        <a:srgbClr val="5B9BD5"/>
+      </a:accent1>
+      <a:accent2>
+        <a:srgbClr val="ED7D31"/>
+      </a:accent2>
+      <a:accent3>
+        <a:srgbClr val="A5A5A5"/>
+      </a:accent3>
+      <a:accent4>
+        <a:srgbClr val="FFC000"/>
+      </a:accent4>
+      <a:accent5>
+        <a:srgbClr val="4472C4"/>
+      </a:accent5>
+      <a:accent6>
+        <a:srgbClr val="70AD47"/>
+      </a:accent6>
+      <a:hlink>
+        <a:srgbClr val="0563C1"/>
+      </a:hlink>
+      <a:folHlink>
+        <a:srgbClr val="954F72"/>
+      </a:folHlink>
+    </a:clrScheme>
+    <a:fontScheme name="Office">
+      <a:majorFont>
+        <a:latin typeface="Calibri Light" panose="020F0302020204030204"/>
+        <a:ea typeface=""/>
+        <a:cs typeface=""/>
+        <a:font script="Jpan" typeface="ＭＳ Ｐゴシック"/>
+        <a:font script="Hang" typeface="맑은 고딕"/>
+        <a:font script="Hans" typeface="宋体"/>
+        <a:font script="Hant" typeface="新細明體"/>
+        <a:font script="Arab" typeface="Times New Roman"/>
+        <a:font script="Hebr" typeface="Times New Roman"/>
+        <a:font script="Thai" typeface="Angsana New"/>
+        <a:font script="Ethi" typeface="Nyala"/>
+        <a:font script="Beng" typeface="Vrinda"/>
+        <a:font script="Gujr" typeface="Shruti"/>
+        <a:font script="Khmr" typeface="MoolBoran"/>
+        <a:font script="Knda" typeface="Tunga"/>
+        <a:font script="Guru" typeface="Raavi"/>
+        <a:font script="Cans" typeface="Euphemia"/>
+        <a:font script="Cher" typeface="Plantagenet Cherokee"/>
+        <a:font script="Yiii" typeface="Microsoft Yi Baiti"/>
+        <a:font script="Tibt" typeface="Microsoft Himalaya"/>
+        <a:font script="Thaa" typeface="MV Boli"/>
+        <a:font script="Deva" typeface="Mangal"/>
+        <a:font script="Telu" typeface="Gautami"/>
+        <a:font script="Taml" typeface="Latha"/>
+        <a:font script="Syrc" typeface="Estrangelo Edessa"/>
+        <a:font script="Orya" typeface="Kalinga"/>
+        <a:font script="Mlym" typeface="Kartika"/>
+        <a:font script="Laoo" typeface="DokChampa"/>
+        <a:font script="Sinh" typeface="Iskoola Pota"/>
+        <a:font script="Mong" typeface="Mongolian Baiti"/>
+        <a:font script="Viet" typeface="Times New Roman"/>
+        <a:font script="Uigh" typeface="Microsoft Uighur"/>
+        <a:font script="Geor" typeface="Sylfaen"/>
+      </a:majorFont>
+      <a:minorFont>
+        <a:latin typeface="Calibri" panose="020F0502020204030204"/>
+        <a:ea typeface=""/>
+        <a:cs typeface=""/>
+        <a:font script="Jpan" typeface="ＭＳ Ｐゴシック"/>
+        <a:font script="Hang" typeface="맑은 고딕"/>
+        <a:font script="Hans" typeface="宋体"/>
+        <a:font script="Hant" typeface="新細明體"/>
+        <a:font script="Arab" typeface="Arial"/>
+        <a:font script="Hebr" typeface="Arial"/>
+        <a:font script="Thai" typeface="Cordia New"/>
+        <a:font script="Ethi" typeface="Nyala"/>
+        <a:font script="Beng" typeface="Vrinda"/>
+        <a:font script="Gujr" typeface="Shruti"/>
+        <a:font script="Khmr" typeface="DaunPenh"/>
+        <a:font script="Knda" typeface="Tunga"/>
+        <a:font script="Guru" typeface="Raavi"/>
+        <a:font script="Cans" typeface="Euphemia"/>
+        <a:font script="Cher" typeface="Plantagenet Cherokee"/>
+        <a:font script="Yiii" typeface="Microsoft Yi Baiti"/>
+        <a:font script="Tibt" typeface="Microsoft Himalaya"/>
+        <a:font script="Thaa" typeface="MV Boli"/>
+        <a:font script="Deva" typeface="Mangal"/>
+        <a:font script="Telu" typeface="Gautami"/>
+        <a:font script="Taml" typeface="Latha"/>
+        <a:font script="Syrc" typeface="Estrangelo Edessa"/>
+        <a:font script="Orya" typeface="Kalinga"/>
+        <a:font script="Mlym" typeface="Kartika"/>
+        <a:font script="Laoo" typeface="DokChampa"/>
+        <a:font script="Sinh" typeface="Iskoola Pota"/>
+        <a:font script="Mong" typeface="Mongolian Baiti"/>
+        <a:font script="Viet" typeface="Arial"/>
+        <a:font script="Uigh" typeface="Microsoft Uighur"/>
+        <a:font script="Geor" typeface="Sylfaen"/>
+      </a:minorFont>
+    </a:fontScheme>
+    <a:fmtScheme name="Office">
+      <a:fillStyleLst>
+        <a:solidFill>
+          <a:schemeClr val="phClr"/>
+        </a:solidFill>
+        <a:gradFill rotWithShape="1">
+          <a:gsLst>
+            <a:gs pos="0">
+              <a:schemeClr val="phClr">
+                <a:lumMod val="110000"/>
+                <a:satMod val="105000"/>
+                <a:tint val="67000"/>
+              </a:schemeClr>
+            </a:gs>
+            <a:gs pos="50000">
+              <a:schemeClr val="phClr">
+                <a:lumMod val="105000"/>
+                <a:satMod val="103000"/>
+                <a:tint val="73000"/>
+              </a:schemeClr>
+            </a:gs>
+            <a:gs pos="100000">
+              <a:schemeClr val="phClr">
+                <a:lumMod val="105000"/>
+                <a:satMod val="109000"/>
+                <a:tint val="81000"/>
+              </a:schemeClr>
+            </a:gs>
+          </a:gsLst>
+          <a:lin ang="5400000" scaled="0"/>
+        </a:gradFill>
+        <a:gradFill rotWithShape="1">
+          <a:gsLst>
+            <a:gs pos="0">
+              <a:schemeClr val="phClr">
+                <a:satMod val="103000"/>
+                <a:lumMod val="102000"/>
+                <a:tint val="94000"/>
+              </a:schemeClr>
+            </a:gs>
+            <a:gs pos="50000">
+              <a:schemeClr val="phClr">
+                <a:satMod val="110000"/>
+                <a:lumMod val="100000"/>
+                <a:shade val="100000"/>
+              </a:schemeClr>
+            </a:gs>
+            <a:gs pos="100000">
+              <a:schemeClr val="phClr">
+                <a:lumMod val="99000"/>
+                <a:satMod val="120000"/>
+                <a:shade val="78000"/>
+              </a:schemeClr>
+            </a:gs>
+          </a:gsLst>
+          <a:lin ang="5400000" scaled="0"/>
+        </a:gradFill>
+      </a:fillStyleLst>
+      <a:lnStyleLst>
+        <a:ln w="6350" cap="flat" cmpd="sng" algn="ctr">
+          <a:solidFill>
+            <a:schemeClr val="phClr"/>
+          </a:solidFill>
+          <a:prstDash val="solid"/>
+          <a:miter lim="800000"/>
+        </a:ln>
+        <a:ln w="12700" cap="flat" cmpd="sng" algn="ctr">
+          <a:solidFill>
+            <a:schemeClr val="phClr"/>
+          </a:solidFill>
+          <a:prstDash val="solid"/>
+          <a:miter lim="800000"/>
+        </a:ln>
+        <a:ln w="19050" cap="flat" cmpd="sng" algn="ctr">
+          <a:solidFill>
+            <a:schemeClr val="phClr"/>
+          </a:solidFill>
+          <a:prstDash val="solid"/>
+          <a:miter lim="800000"/>
+        </a:ln>
+      </a:lnStyleLst>
+      <a:effectStyleLst>
+        <a:effectStyle>
+          <a:effectLst/>
+        </a:effectStyle>
+        <a:effectStyle>
+          <a:effectLst/>
+        </a:effectStyle>
+        <a:effectStyle>
+          <a:effectLst>
+            <a:outerShdw blurRad="57150" dist="19050" dir="5400000" algn="ctr" rotWithShape="0">
+              <a:srgbClr val="000000">
+                <a:alpha val="63000"/>
+              </a:srgbClr>
+            </a:outerShdw>
+          </a:effectLst>
+        </a:effectStyle>
+      </a:effectStyleLst>
+      <a:bgFillStyleLst>
+        <a:solidFill>
+          <a:schemeClr val="phClr"/>
+        </a:solidFill>
+        <a:solidFill>
+          <a:schemeClr val="phClr">
+            <a:tint val="95000"/>
+            <a:satMod val="170000"/>
+          </a:schemeClr>
+        </a:solidFill>
+        <a:gradFill rotWithShape="1">
+          <a:gsLst>
+            <a:gs pos="0">
+              <a:schemeClr val="phClr">
+                <a:tint val="93000"/>
+                <a:satMod val="150000"/>
+                <a:shade val="98000"/>
+                <a:lumMod val="102000"/>
+              </a:schemeClr>
+            </a:gs>
+            <a:gs pos="50000">
+              <a:schemeClr val="phClr">
+                <a:tint val="98000"/>
+                <a:satMod val="130000"/>
+                <a:shade val="90000"/>
+                <a:lumMod val="103000"/>
+              </a:schemeClr>
+            </a:gs>
+            <a:gs pos="100000">
+              <a:schemeClr val="phClr">
+                <a:shade val="63000"/>
+                <a:satMod val="120000"/>
+              </a:schemeClr>
+            </a:gs>
+          </a:gsLst>
+          <a:lin ang="5400000" scaled="0"/>
+        </a:gradFill>
+      </a:bgFillStyleLst>
+    </a:fmtScheme>
+  </a:themeElements>
+  <a:objectDefaults/>
+  <a:extraClrSchemeLst/>
+  <a:extLst>
+    <a:ext uri="{05A4C25C-085E-4340-85A3-A5531E510DB2}">
+      <thm15:themeFamily xmlns:thm15="http://schemas.microsoft.com/office/thememl/2012/main" name="Office Theme" id="{62F939B6-93AF-4DB8-9C6B-D6C7DFDC589F}" vid="{4A3C46E8-61CC-4603-A589-7422A47A8E4A}"/>
+    </a:ext>
+  </a:extLst>
+</a:theme>
 </file>
</xml_diff>